<commit_message>
Visualisation and Analyst Update Romail
</commit_message>
<xml_diff>
--- a/Vis_and_analysis_assignment.pptx
+++ b/Vis_and_analysis_assignment.pptx
@@ -5,23 +5,23 @@
     <p:sldMasterId id="2147483648" r:id="rId1"/>
   </p:sldMasterIdLst>
   <p:notesMasterIdLst>
-    <p:notesMasterId r:id="rId5"/>
+    <p:notesMasterId r:id="rId13"/>
   </p:notesMasterIdLst>
   <p:handoutMasterIdLst>
-    <p:handoutMasterId r:id="rId15"/>
+    <p:handoutMasterId r:id="rId14"/>
   </p:handoutMasterIdLst>
   <p:sldIdLst>
-    <p:sldId id="289" r:id="rId3"/>
-    <p:sldId id="329" r:id="rId4"/>
-    <p:sldId id="336" r:id="rId6"/>
-    <p:sldId id="340" r:id="rId7"/>
-    <p:sldId id="339" r:id="rId8"/>
-    <p:sldId id="260" r:id="rId9"/>
-    <p:sldId id="259" r:id="rId10"/>
-    <p:sldId id="353" r:id="rId11"/>
-    <p:sldId id="356" r:id="rId12"/>
-    <p:sldId id="351" r:id="rId13"/>
-    <p:sldId id="352" r:id="rId14"/>
+    <p:sldId id="289" r:id="rId2"/>
+    <p:sldId id="357" r:id="rId3"/>
+    <p:sldId id="336" r:id="rId4"/>
+    <p:sldId id="340" r:id="rId5"/>
+    <p:sldId id="339" r:id="rId6"/>
+    <p:sldId id="260" r:id="rId7"/>
+    <p:sldId id="259" r:id="rId8"/>
+    <p:sldId id="353" r:id="rId9"/>
+    <p:sldId id="356" r:id="rId10"/>
+    <p:sldId id="351" r:id="rId11"/>
+    <p:sldId id="352" r:id="rId12"/>
   </p:sldIdLst>
   <p:sldSz cx="12192000" cy="6858000"/>
   <p:notesSz cx="6858000" cy="9144000"/>
@@ -120,6 +120,40 @@
       </a:defRPr>
     </a:lvl9pPr>
   </p:defaultTextStyle>
+  <p:extLst>
+    <p:ext uri="{EFAFB233-063F-42B5-8137-9DF3F51BA10A}">
+      <p15:sldGuideLst xmlns:p15="http://schemas.microsoft.com/office/powerpoint/2012/main">
+        <p15:guide id="1" orient="horz" pos="2158">
+          <p15:clr>
+            <a:srgbClr val="A4A3A4"/>
+          </p15:clr>
+        </p15:guide>
+        <p15:guide id="2" pos="3840">
+          <p15:clr>
+            <a:srgbClr val="A4A3A4"/>
+          </p15:clr>
+        </p15:guide>
+        <p15:guide id="3" orient="horz" pos="3249">
+          <p15:clr>
+            <a:srgbClr val="A4A3A4"/>
+          </p15:clr>
+        </p15:guide>
+        <p15:guide id="4" pos="7080">
+          <p15:clr>
+            <a:srgbClr val="A4A3A4"/>
+          </p15:clr>
+        </p15:guide>
+        <p15:guide id="5" orient="horz" pos="1353">
+          <p15:clr>
+            <a:srgbClr val="A4A3A4"/>
+          </p15:clr>
+        </p15:guide>
+      </p15:sldGuideLst>
+    </p:ext>
+    <p:ext uri="{2D200454-40CA-4A62-9FC3-DE9A4176ACB9}">
+      <p15:notesGuideLst xmlns:p15="http://schemas.microsoft.com/office/powerpoint/2012/main"/>
+    </p:ext>
+  </p:extLst>
 </p:presentation>
 </file>
 
@@ -205,6 +239,7 @@
           <a:p>
             <a:fld id="{93FAAC3A-BD1F-4A00-9099-74B95789FE00}" type="datetimeFigureOut">
               <a:rPr lang="en-GB" smtClean="0"/>
+              <a:t>16/11/2024</a:t>
             </a:fld>
             <a:endParaRPr lang="en-GB"/>
           </a:p>
@@ -270,6 +305,7 @@
           <a:p>
             <a:fld id="{C29F51D9-0FEB-436E-9280-D6033F603547}" type="slidenum">
               <a:rPr lang="en-GB" smtClean="0"/>
+              <a:t>‹#›</a:t>
             </a:fld>
             <a:endParaRPr lang="en-GB"/>
           </a:p>
@@ -287,8 +323,8 @@
     <inkml:context xml:id="ctx0">
       <inkml:inkSource xml:id="inkSrc0">
         <inkml:traceFormat>
-          <inkml:channel name="X" type="integer" max="2" min="-2" units="cm"/>
-          <inkml:channel name="Y" type="integer" max="2" min="-2" units="cm"/>
+          <inkml:channel name="X" type="integer" min="-2" max="2" units="cm"/>
+          <inkml:channel name="Y" type="integer" min="-2" max="2" units="cm"/>
           <inkml:channel name="F" type="integer" max="1023" units="cm"/>
         </inkml:traceFormat>
         <inkml:channelProperties>
@@ -302,7 +338,7 @@
     <inkml:brush xml:id="br0">
       <inkml:brushProperty name="width" value="0.1" units="cm"/>
       <inkml:brushProperty name="height" value="0.1" units="cm"/>
-      <inkml:brushProperty name="color" value="#e71224"/>
+      <inkml:brushProperty name="color" value="#E71224"/>
     </inkml:brush>
   </inkml:definitions>
   <inkml:trace contextRef="#ctx0" brushRef="#br0">0 0 24575,'0'0'-8191</inkml:trace>
@@ -391,6 +427,7 @@
           <a:p>
             <a:fld id="{8E359C8A-39F6-4045-9163-4042C4C26B15}" type="datetimeFigureOut">
               <a:rPr lang="en-GB" smtClean="0"/>
+              <a:t>16/11/2024</a:t>
             </a:fld>
             <a:endParaRPr lang="en-GB"/>
           </a:p>
@@ -457,7 +494,6 @@
               <a:rPr lang="en-US"/>
               <a:t>Click to edit Master text styles</a:t>
             </a:r>
-            <a:endParaRPr lang="en-US"/>
           </a:p>
           <a:p>
             <a:pPr lvl="1"/>
@@ -465,7 +501,6 @@
               <a:rPr lang="en-US"/>
               <a:t>Second level</a:t>
             </a:r>
-            <a:endParaRPr lang="en-US"/>
           </a:p>
           <a:p>
             <a:pPr lvl="2"/>
@@ -473,7 +508,6 @@
               <a:rPr lang="en-US"/>
               <a:t>Third level</a:t>
             </a:r>
-            <a:endParaRPr lang="en-US"/>
           </a:p>
           <a:p>
             <a:pPr lvl="3"/>
@@ -481,7 +515,6 @@
               <a:rPr lang="en-US"/>
               <a:t>Fourth level</a:t>
             </a:r>
-            <a:endParaRPr lang="en-US"/>
           </a:p>
           <a:p>
             <a:pPr lvl="4"/>
@@ -553,6 +586,7 @@
           <a:p>
             <a:fld id="{30370952-48CC-46D7-9FCD-59FAD40CC025}" type="slidenum">
               <a:rPr lang="en-GB" smtClean="0"/>
+              <a:t>‹#›</a:t>
             </a:fld>
             <a:endParaRPr lang="en-GB"/>
           </a:p>
@@ -721,12 +755,18 @@
           <a:p>
             <a:fld id="{30370952-48CC-46D7-9FCD-59FAD40CC025}" type="slidenum">
               <a:rPr lang="en-GB" smtClean="0"/>
+              <a:t>2</a:t>
             </a:fld>
             <a:endParaRPr lang="en-GB"/>
           </a:p>
         </p:txBody>
       </p:sp>
     </p:spTree>
+    <p:extLst>
+      <p:ext uri="{BB962C8B-B14F-4D97-AF65-F5344CB8AC3E}">
+        <p14:creationId xmlns:p14="http://schemas.microsoft.com/office/powerpoint/2010/main" val="3780942166"/>
+      </p:ext>
+    </p:extLst>
   </p:cSld>
   <p:clrMapOvr>
     <a:masterClrMapping/>
@@ -799,6 +839,7 @@
           <a:p>
             <a:fld id="{30370952-48CC-46D7-9FCD-59FAD40CC025}" type="slidenum">
               <a:rPr lang="en-GB" smtClean="0"/>
+              <a:t>3</a:t>
             </a:fld>
             <a:endParaRPr lang="en-GB"/>
           </a:p>
@@ -877,6 +918,7 @@
           <a:p>
             <a:fld id="{30370952-48CC-46D7-9FCD-59FAD40CC025}" type="slidenum">
               <a:rPr lang="en-GB" smtClean="0"/>
+              <a:t>4</a:t>
             </a:fld>
             <a:endParaRPr lang="en-GB"/>
           </a:p>
@@ -955,6 +997,7 @@
           <a:p>
             <a:fld id="{30370952-48CC-46D7-9FCD-59FAD40CC025}" type="slidenum">
               <a:rPr lang="en-GB" smtClean="0"/>
+              <a:t>5</a:t>
             </a:fld>
             <a:endParaRPr lang="en-GB"/>
           </a:p>
@@ -1070,6 +1113,7 @@
               <a:rPr lang="en-GB" sz="1200" b="0" strike="noStrike" spc="-1">
                 <a:latin typeface="Times New Roman"/>
               </a:rPr>
+              <a:t>6</a:t>
             </a:fld>
             <a:endParaRPr lang="en-US" sz="1200" b="0" strike="noStrike" spc="-1">
               <a:latin typeface="Times New Roman"/>
@@ -1187,6 +1231,7 @@
               <a:rPr lang="en-GB" sz="1200" b="0" strike="noStrike" spc="-1">
                 <a:latin typeface="Times New Roman"/>
               </a:rPr>
+              <a:t>8</a:t>
             </a:fld>
             <a:endParaRPr lang="en-US" sz="1200" b="0" strike="noStrike" spc="-1">
               <a:latin typeface="Times New Roman"/>
@@ -1304,6 +1349,7 @@
               <a:rPr lang="en-GB" sz="1200" b="0" strike="noStrike" spc="-1">
                 <a:latin typeface="Times New Roman"/>
               </a:rPr>
+              <a:t>9</a:t>
             </a:fld>
             <a:endParaRPr lang="en-US" sz="1200" b="0" strike="noStrike" spc="-1">
               <a:latin typeface="Times New Roman"/>
@@ -1421,6 +1467,7 @@
               <a:rPr lang="en-GB" sz="1200" b="0" strike="noStrike" spc="-1">
                 <a:latin typeface="Times New Roman"/>
               </a:rPr>
+              <a:t>10</a:t>
             </a:fld>
             <a:endParaRPr lang="en-US" sz="1200" b="0" strike="noStrike" spc="-1">
               <a:latin typeface="Times New Roman"/>
@@ -1538,6 +1585,7 @@
               <a:rPr lang="en-GB" sz="1200" b="0" strike="noStrike" spc="-1">
                 <a:latin typeface="Times New Roman"/>
               </a:rPr>
+              <a:t>11</a:t>
             </a:fld>
             <a:endParaRPr lang="en-US" sz="1200" b="0" strike="noStrike" spc="-1">
               <a:latin typeface="Times New Roman"/>
@@ -1673,7 +1721,6 @@
               <a:rPr lang="en-US" dirty="0"/>
               <a:t>Picture</a:t>
             </a:r>
-            <a:endParaRPr lang="en-US" dirty="0"/>
           </a:p>
         </p:txBody>
       </p:sp>
@@ -1746,7 +1793,7 @@
 </file>
 
 <file path=ppt/slideLayouts/slideLayout12.xml><?xml version="1.0" encoding="utf-8"?>
-<p:sldLayout xmlns:a="http://schemas.openxmlformats.org/drawingml/2006/main" xmlns:r="http://schemas.openxmlformats.org/officeDocument/2006/relationships" xmlns:p="http://schemas.openxmlformats.org/presentationml/2006/main" preserve="1" showMasterSp="0" userDrawn="1">
+<p:sldLayout xmlns:a="http://schemas.openxmlformats.org/drawingml/2006/main" xmlns:r="http://schemas.openxmlformats.org/officeDocument/2006/relationships" xmlns:p="http://schemas.openxmlformats.org/presentationml/2006/main" showMasterSp="0" preserve="1" userDrawn="1">
   <p:cSld name="Icons and text">
     <p:bg>
       <p:bgPr>
@@ -1789,7 +1836,6 @@
               <a:rPr lang="en-GB" dirty="0"/>
               <a:t>PRESENTATION TITLE (ADD VIA INSERT, HEADER &amp; FOOTER)</a:t>
             </a:r>
-            <a:endParaRPr lang="en-GB" dirty="0"/>
           </a:p>
         </p:txBody>
       </p:sp>
@@ -1810,6 +1856,7 @@
           <a:p>
             <a:fld id="{E4D355CA-84B7-41B1-B164-8BB439CC7C6B}" type="slidenum">
               <a:rPr lang="en-GB" smtClean="0"/>
+              <a:t>‹#›</a:t>
             </a:fld>
             <a:endParaRPr lang="en-GB"/>
           </a:p>
@@ -1909,7 +1956,6 @@
               <a:rPr lang="en-GB" dirty="0"/>
               <a:t>Add Text</a:t>
             </a:r>
-            <a:endParaRPr lang="en-GB" dirty="0"/>
           </a:p>
         </p:txBody>
       </p:sp>
@@ -2077,7 +2123,6 @@
               <a:rPr lang="en-US" dirty="0"/>
               <a:t>Text</a:t>
             </a:r>
-            <a:endParaRPr lang="en-US" dirty="0"/>
           </a:p>
         </p:txBody>
       </p:sp>
@@ -2331,6 +2376,7 @@
           <a:p>
             <a:fld id="{E4D355CA-84B7-41B1-B164-8BB439CC7C6B}" type="slidenum">
               <a:rPr lang="en-GB" smtClean="0"/>
+              <a:t>‹#›</a:t>
             </a:fld>
             <a:endParaRPr lang="en-GB" dirty="0"/>
           </a:p>
@@ -2580,6 +2626,7 @@
           <a:p>
             <a:fld id="{E4D355CA-84B7-41B1-B164-8BB439CC7C6B}" type="slidenum">
               <a:rPr lang="en-GB" smtClean="0"/>
+              <a:t>‹#›</a:t>
             </a:fld>
             <a:endParaRPr lang="en-GB" dirty="0"/>
           </a:p>
@@ -2747,7 +2794,6 @@
               <a:rPr lang="en-GB" dirty="0"/>
               <a:t>PRESENTATION TITLE (ADD VIA INSERT, HEADER &amp; FOOTER)</a:t>
             </a:r>
-            <a:endParaRPr lang="en-GB" dirty="0"/>
           </a:p>
         </p:txBody>
       </p:sp>
@@ -2783,6 +2829,7 @@
           <a:p>
             <a:fld id="{E4D355CA-84B7-41B1-B164-8BB439CC7C6B}" type="slidenum">
               <a:rPr lang="en-GB" smtClean="0"/>
+              <a:t>‹#›</a:t>
             </a:fld>
             <a:endParaRPr lang="en-GB" dirty="0"/>
           </a:p>
@@ -3010,7 +3057,6 @@
               <a:rPr lang="en-GB" dirty="0"/>
               <a:t>Add Text</a:t>
             </a:r>
-            <a:endParaRPr lang="en-GB" dirty="0"/>
           </a:p>
         </p:txBody>
       </p:sp>
@@ -3116,7 +3162,6 @@
               <a:rPr lang="en-GB" dirty="0"/>
               <a:t>PRESENTATION TITLE (ADD VIA INSERT, HEADER &amp; FOOTER)</a:t>
             </a:r>
-            <a:endParaRPr lang="en-GB" dirty="0"/>
           </a:p>
         </p:txBody>
       </p:sp>
@@ -3137,6 +3182,7 @@
           <a:p>
             <a:fld id="{E4D355CA-84B7-41B1-B164-8BB439CC7C6B}" type="slidenum">
               <a:rPr lang="en-GB" smtClean="0"/>
+              <a:t>‹#›</a:t>
             </a:fld>
             <a:endParaRPr lang="en-GB"/>
           </a:p>
@@ -3296,7 +3342,6 @@
               <a:rPr lang="en-GB" dirty="0"/>
               <a:t>Add Text</a:t>
             </a:r>
-            <a:endParaRPr lang="en-GB" dirty="0"/>
           </a:p>
         </p:txBody>
       </p:sp>
@@ -3319,7 +3364,6 @@
               <a:rPr lang="en-GB" dirty="0"/>
               <a:t>PRESENTATION TITLE (ADD VIA INSERT, HEADER &amp; FOOTER)</a:t>
             </a:r>
-            <a:endParaRPr lang="en-GB" dirty="0"/>
           </a:p>
         </p:txBody>
       </p:sp>
@@ -3340,6 +3384,7 @@
           <a:p>
             <a:fld id="{E4D355CA-84B7-41B1-B164-8BB439CC7C6B}" type="slidenum">
               <a:rPr lang="en-GB" smtClean="0"/>
+              <a:t>‹#›</a:t>
             </a:fld>
             <a:endParaRPr lang="en-GB"/>
           </a:p>
@@ -3500,7 +3545,6 @@
               <a:rPr lang="en-GB" dirty="0"/>
               <a:t>Add Text</a:t>
             </a:r>
-            <a:endParaRPr lang="en-GB" dirty="0"/>
           </a:p>
         </p:txBody>
       </p:sp>
@@ -3521,6 +3565,7 @@
           <a:p>
             <a:fld id="{E4D355CA-84B7-41B1-B164-8BB439CC7C6B}" type="slidenum">
               <a:rPr lang="en-GB" smtClean="0"/>
+              <a:t>‹#›</a:t>
             </a:fld>
             <a:endParaRPr lang="en-GB"/>
           </a:p>
@@ -3630,6 +3675,7 @@
           <a:p>
             <a:fld id="{E4D355CA-84B7-41B1-B164-8BB439CC7C6B}" type="slidenum">
               <a:rPr lang="en-GB" smtClean="0"/>
+              <a:t>‹#›</a:t>
             </a:fld>
             <a:endParaRPr lang="en-GB" dirty="0"/>
           </a:p>
@@ -3868,7 +3914,6 @@
               <a:rPr lang="en-GB" dirty="0"/>
               <a:t>PRESENTATION TITLE (ADD VIA INSERT, HEADER &amp; FOOTER)</a:t>
             </a:r>
-            <a:endParaRPr lang="en-GB" dirty="0"/>
           </a:p>
         </p:txBody>
       </p:sp>
@@ -3889,6 +3934,7 @@
           <a:p>
             <a:fld id="{E4D355CA-84B7-41B1-B164-8BB439CC7C6B}" type="slidenum">
               <a:rPr lang="en-GB" smtClean="0"/>
+              <a:t>‹#›</a:t>
             </a:fld>
             <a:endParaRPr lang="en-GB"/>
           </a:p>
@@ -4039,7 +4085,6 @@
               <a:rPr lang="en-GB" dirty="0"/>
               <a:t>PRESENTATION TITLE (ADD VIA INSERT, HEADER &amp; FOOTER)</a:t>
             </a:r>
-            <a:endParaRPr lang="en-GB" dirty="0"/>
           </a:p>
         </p:txBody>
       </p:sp>
@@ -4060,6 +4105,7 @@
           <a:p>
             <a:fld id="{E4D355CA-84B7-41B1-B164-8BB439CC7C6B}" type="slidenum">
               <a:rPr lang="en-GB" smtClean="0"/>
+              <a:t>‹#›</a:t>
             </a:fld>
             <a:endParaRPr lang="en-GB"/>
           </a:p>
@@ -4369,7 +4415,6 @@
               <a:rPr lang="en-US" dirty="0"/>
               <a:t>Click to edit Master text styles</a:t>
             </a:r>
-            <a:endParaRPr lang="en-US" dirty="0"/>
           </a:p>
           <a:p>
             <a:pPr lvl="1"/>
@@ -4377,7 +4422,6 @@
               <a:rPr lang="en-US" dirty="0"/>
               <a:t>Second level</a:t>
             </a:r>
-            <a:endParaRPr lang="en-US" dirty="0"/>
           </a:p>
           <a:p>
             <a:pPr lvl="2"/>
@@ -4385,7 +4429,6 @@
               <a:rPr lang="en-US" dirty="0"/>
               <a:t>Third level</a:t>
             </a:r>
-            <a:endParaRPr lang="en-US" dirty="0"/>
           </a:p>
           <a:p>
             <a:pPr lvl="3"/>
@@ -4393,7 +4436,6 @@
               <a:rPr lang="en-GB" dirty="0"/>
               <a:t>Fourth level</a:t>
             </a:r>
-            <a:endParaRPr lang="en-GB" dirty="0"/>
           </a:p>
           <a:p>
             <a:pPr lvl="4"/>
@@ -4444,7 +4486,6 @@
               <a:rPr lang="en-GB" dirty="0"/>
               <a:t>PRESENTATION TITLE (ADD VIA INSERT, HEADER &amp; FOOTER)</a:t>
             </a:r>
-            <a:endParaRPr lang="en-GB" dirty="0"/>
           </a:p>
         </p:txBody>
       </p:sp>
@@ -4485,6 +4526,7 @@
           <a:p>
             <a:fld id="{E4D355CA-84B7-41B1-B164-8BB439CC7C6B}" type="slidenum">
               <a:rPr lang="en-GB" smtClean="0"/>
+              <a:t>‹#›</a:t>
             </a:fld>
             <a:endParaRPr lang="en-GB" dirty="0"/>
           </a:p>
@@ -4808,7 +4850,7 @@
     <p:bg>
       <p:bgPr>
         <a:blipFill dpi="0" rotWithShape="1">
-          <a:blip r:embed="rId1">
+          <a:blip r:embed="rId2">
             <a:lum/>
           </a:blip>
           <a:srcRect/>
@@ -4906,7 +4948,6 @@
               <a:rPr lang="en-US" altLang="en-US" sz="2000" dirty="0"/>
               <a:t>Deepak</a:t>
             </a:r>
-            <a:endParaRPr lang="en-US" altLang="en-US" sz="2000" dirty="0"/>
           </a:p>
         </p:txBody>
       </p:sp>
@@ -4942,7 +4983,6 @@
               <a:rPr lang="en-GB" dirty="0"/>
               <a:t>                Names of Student Attendees  (all group should attend to get feedback): </a:t>
             </a:r>
-            <a:endParaRPr lang="en-GB" dirty="0"/>
           </a:p>
         </p:txBody>
       </p:sp>
@@ -4963,6 +5003,7 @@
           <a:p>
             <a:fld id="{E4D355CA-84B7-41B1-B164-8BB439CC7C6B}" type="slidenum">
               <a:rPr lang="en-GB" smtClean="0"/>
+              <a:t>1</a:t>
             </a:fld>
             <a:endParaRPr lang="en-GB" dirty="0"/>
           </a:p>
@@ -5075,6 +5116,7 @@
                 </a:solidFill>
                 <a:latin typeface="Arial"/>
               </a:rPr>
+              <a:t>10</a:t>
             </a:fld>
             <a:endParaRPr lang="en-US" sz="1500" b="0" strike="noStrike" spc="-1">
               <a:latin typeface="Times New Roman"/>
@@ -5183,7 +5225,6 @@
               <a:rPr lang="en-US" altLang="en-GB" sz="1400" dirty="0"/>
               <a:t>median_value &lt;- median(data_long_clean$Avg_Fund_Allocation, na.rm = TRUE)</a:t>
             </a:r>
-            <a:endParaRPr lang="en-US" altLang="en-GB" sz="1400" dirty="0"/>
           </a:p>
           <a:p>
             <a:pPr marL="285750" indent="-285750">
@@ -5194,7 +5235,6 @@
               <a:rPr lang="en-US" altLang="en-GB" sz="1400" dirty="0"/>
               <a:t>data_long_clean &lt;- data_long_clean %&gt;%</a:t>
             </a:r>
-            <a:endParaRPr lang="en-US" altLang="en-GB" sz="1400" dirty="0"/>
           </a:p>
           <a:p>
             <a:pPr marL="285750" indent="-285750">
@@ -5205,7 +5245,6 @@
               <a:rPr lang="en-US" altLang="en-GB" sz="1400" dirty="0"/>
               <a:t>  mutate(group_combined = ifelse(Avg_Fund_Allocation &gt;= median_value, "GroupA", "GroupB"))</a:t>
             </a:r>
-            <a:endParaRPr lang="en-US" altLang="en-GB" sz="1400" dirty="0"/>
           </a:p>
           <a:p>
             <a:pPr marL="285750" indent="-285750">
@@ -5216,7 +5255,6 @@
               <a:rPr lang="en-US" altLang="en-GB" sz="1400" dirty="0"/>
               <a:t># check if we have two groups</a:t>
             </a:r>
-            <a:endParaRPr lang="en-US" altLang="en-GB" sz="1400" dirty="0"/>
           </a:p>
           <a:p>
             <a:pPr marL="285750" indent="-285750">
@@ -5227,7 +5265,6 @@
               <a:rPr lang="en-US" altLang="en-GB" sz="1400" dirty="0"/>
               <a:t>table(data_long_clean$group_combined)</a:t>
             </a:r>
-            <a:endParaRPr lang="en-US" altLang="en-GB" sz="1400" dirty="0"/>
           </a:p>
           <a:p>
             <a:pPr marL="285750" indent="-285750">
@@ -5238,7 +5275,6 @@
               <a:rPr lang="en-US" altLang="en-GB" sz="1400" dirty="0"/>
               <a:t># Filter data to include only GroupA and GroupB</a:t>
             </a:r>
-            <a:endParaRPr lang="en-US" altLang="en-GB" sz="1400" dirty="0"/>
           </a:p>
           <a:p>
             <a:pPr marL="285750" indent="-285750">
@@ -5249,7 +5285,6 @@
               <a:rPr lang="en-US" altLang="en-GB" sz="1400" dirty="0"/>
               <a:t>data_two_groups &lt;- data_long_clean %&gt;%</a:t>
             </a:r>
-            <a:endParaRPr lang="en-US" altLang="en-GB" sz="1400" dirty="0"/>
           </a:p>
           <a:p>
             <a:pPr marL="285750" indent="-285750">
@@ -5260,7 +5295,6 @@
               <a:rPr lang="en-US" altLang="en-GB" sz="1400" dirty="0"/>
               <a:t>  filter(group_combined %in% c("GroupA", "GroupB"))</a:t>
             </a:r>
-            <a:endParaRPr lang="en-US" altLang="en-GB" sz="1400" dirty="0"/>
           </a:p>
           <a:p>
             <a:pPr marL="285750" indent="-285750">
@@ -5271,7 +5305,6 @@
               <a:rPr lang="en-US" altLang="en-GB" sz="1400" dirty="0"/>
               <a:t># Check that filtering worked correctly</a:t>
             </a:r>
-            <a:endParaRPr lang="en-US" altLang="en-GB" sz="1400" dirty="0"/>
           </a:p>
           <a:p>
             <a:pPr marL="285750" indent="-285750">
@@ -5282,7 +5315,6 @@
               <a:rPr lang="en-US" altLang="en-GB" sz="1400" dirty="0"/>
               <a:t>table(data_two_groups$group_combined)</a:t>
             </a:r>
-            <a:endParaRPr lang="en-US" altLang="en-GB" sz="1400" dirty="0"/>
           </a:p>
           <a:p>
             <a:pPr marL="285750" indent="-285750">
@@ -5293,7 +5325,6 @@
               <a:rPr lang="en-US" altLang="en-GB" sz="1400" dirty="0"/>
               <a:t># Perform the Wilcoxon test only if there are two groups</a:t>
             </a:r>
-            <a:endParaRPr lang="en-US" altLang="en-GB" sz="1400" dirty="0"/>
           </a:p>
           <a:p>
             <a:pPr marL="285750" indent="-285750">
@@ -5304,7 +5335,6 @@
               <a:rPr lang="en-US" altLang="en-GB" sz="1400" dirty="0"/>
               <a:t>if (length(unique(data_two_groups$group_combined)) == 2) {</a:t>
             </a:r>
-            <a:endParaRPr lang="en-US" altLang="en-GB" sz="1400" dirty="0"/>
           </a:p>
           <a:p>
             <a:pPr marL="285750" indent="-285750">
@@ -5315,7 +5345,6 @@
               <a:rPr lang="en-US" altLang="en-GB" sz="1400" dirty="0"/>
               <a:t>  wilcoxon_result &lt;- wilcox.test(Avg_Fund_Allocation ~ group_combined, data = data_two_groups)</a:t>
             </a:r>
-            <a:endParaRPr lang="en-US" altLang="en-GB" sz="1400" dirty="0"/>
           </a:p>
           <a:p>
             <a:pPr marL="285750" indent="-285750">
@@ -5326,7 +5355,6 @@
               <a:rPr lang="en-US" altLang="en-GB" sz="1400" dirty="0"/>
               <a:t>  print(wilcoxon_result)</a:t>
             </a:r>
-            <a:endParaRPr lang="en-US" altLang="en-GB" sz="1400" dirty="0"/>
           </a:p>
           <a:p>
             <a:pPr marL="285750" indent="-285750">
@@ -5337,7 +5365,6 @@
               <a:rPr lang="en-US" altLang="en-GB" sz="1400" dirty="0"/>
               <a:t>} else {</a:t>
             </a:r>
-            <a:endParaRPr lang="en-US" altLang="en-GB" sz="1400" dirty="0"/>
           </a:p>
           <a:p>
             <a:pPr marL="285750" indent="-285750">
@@ -5348,7 +5375,6 @@
               <a:rPr lang="en-US" altLang="en-GB" sz="1400" dirty="0"/>
               <a:t>  print("Data does not contain exactly two groups.")</a:t>
             </a:r>
-            <a:endParaRPr lang="en-US" altLang="en-GB" sz="1400" dirty="0"/>
           </a:p>
           <a:p>
             <a:pPr marL="285750" indent="-285750">
@@ -5359,7 +5385,6 @@
               <a:rPr lang="en-US" altLang="en-GB" sz="1400" dirty="0"/>
               <a:t>}</a:t>
             </a:r>
-            <a:endParaRPr lang="en-US" altLang="en-GB" sz="1400" dirty="0"/>
           </a:p>
         </p:txBody>
       </p:sp>
@@ -5470,6 +5495,7 @@
                 </a:solidFill>
                 <a:latin typeface="Arial"/>
               </a:rPr>
+              <a:t>11</a:t>
             </a:fld>
             <a:endParaRPr lang="en-US" sz="1500" b="0" strike="noStrike" spc="-1">
               <a:latin typeface="Times New Roman"/>
@@ -5578,7 +5604,6 @@
               <a:rPr lang="en-US" altLang="en-US" sz="2000" dirty="0"/>
               <a:t>Test-Statistic value = 298116</a:t>
             </a:r>
-            <a:endParaRPr lang="en-US" altLang="en-US" sz="2000" dirty="0"/>
           </a:p>
           <a:p>
             <a:pPr marL="285750" indent="-285750">
@@ -5589,7 +5614,6 @@
               <a:rPr lang="en-US" altLang="en-US" sz="2000" dirty="0"/>
               <a:t>p-value = 2.2e-16</a:t>
             </a:r>
-            <a:endParaRPr lang="en-US" altLang="en-US" sz="2000" dirty="0"/>
           </a:p>
           <a:p>
             <a:pPr marL="285750" indent="-285750">
@@ -5600,7 +5624,6 @@
               <a:rPr lang="en-US" altLang="en-US" sz="2000" dirty="0"/>
               <a:t>Yes, the result is statistically significant because the p-value is less than 0.05.</a:t>
             </a:r>
-            <a:endParaRPr lang="en-US" altLang="en-US" sz="2000" dirty="0"/>
           </a:p>
           <a:p>
             <a:pPr marL="285750" indent="-285750">
@@ -5611,7 +5634,6 @@
               <a:rPr lang="en-US" altLang="en-US" sz="2000" dirty="0"/>
               <a:t>I will reject the null hypothesis because the p-value is much smaller than the commonly used significance level of 0.05.</a:t>
             </a:r>
-            <a:endParaRPr lang="en-US" altLang="en-US" sz="2000" dirty="0"/>
           </a:p>
           <a:p>
             <a:pPr marL="285750" indent="-285750">
@@ -5622,7 +5644,6 @@
               <a:rPr lang="en-US" altLang="en-US" sz="2000" dirty="0"/>
               <a:t>The result suggests that there is a significant difference in the distribution of the Avg_Fund_Allocation between GroupA and GroupB(On median Avg fund allocation bases).This could imply that the two groups have different needs, priorities, or contexts that influence how funds are distributed.</a:t>
             </a:r>
-            <a:endParaRPr lang="en-US" altLang="en-US" sz="2000" dirty="0"/>
           </a:p>
         </p:txBody>
       </p:sp>
@@ -5778,7 +5799,6 @@
               <a:rPr lang="en-GB" dirty="0"/>
               <a:t>             Names of Student Group Attendees: </a:t>
             </a:r>
-            <a:endParaRPr lang="en-GB" dirty="0"/>
           </a:p>
         </p:txBody>
       </p:sp>
@@ -5799,6 +5819,7 @@
           <a:p>
             <a:fld id="{E4D355CA-84B7-41B1-B164-8BB439CC7C6B}" type="slidenum">
               <a:rPr lang="en-GB" smtClean="0"/>
+              <a:t>2</a:t>
             </a:fld>
             <a:endParaRPr lang="en-GB" dirty="0"/>
           </a:p>
@@ -5832,21 +5853,18 @@
               <a:rPr lang="en-US" altLang="en-GB" sz="1400" dirty="0"/>
               <a:t>DataSet have 92 Rows.</a:t>
             </a:r>
-            <a:endParaRPr lang="en-US" altLang="en-GB" sz="1400" dirty="0"/>
           </a:p>
           <a:p>
             <a:r>
               <a:rPr lang="en-US" altLang="en-GB" sz="1400" dirty="0"/>
               <a:t>Dependent variable: Average fund Allocation</a:t>
             </a:r>
-            <a:endParaRPr lang="en-US" altLang="en-GB" sz="1400" dirty="0"/>
           </a:p>
           <a:p>
             <a:r>
               <a:rPr lang="en-US" altLang="en-GB" sz="1400" dirty="0"/>
               <a:t>Independent Variable: States name</a:t>
             </a:r>
-            <a:endParaRPr lang="en-US" altLang="en-GB" sz="1400" dirty="0"/>
           </a:p>
         </p:txBody>
       </p:sp>
@@ -5893,7 +5911,7 @@
       </p:sp>
       <mc:AlternateContent xmlns:mc="http://schemas.openxmlformats.org/markup-compatibility/2006" xmlns:p14="http://schemas.microsoft.com/office/powerpoint/2010/main">
         <mc:Choice Requires="p14">
-          <p:contentPart r:id="rId1" p14:bwMode="auto">
+          <p:contentPart p14:bwMode="auto" r:id="rId3">
             <p14:nvContentPartPr>
               <p14:cNvPr id="26" name="Ink 25"/>
               <p14:cNvContentPartPr/>
@@ -5911,7 +5929,7 @@
               <p:cNvPr id="26" name="Ink 25"/>
             </p:nvPicPr>
             <p:blipFill>
-              <a:blip r:embed="rId2"/>
+              <a:blip r:embed="rId4"/>
             </p:blipFill>
             <p:spPr>
               <a:xfrm>
@@ -5971,7 +5989,7 @@
           <p:nvPr/>
         </p:nvPicPr>
         <p:blipFill>
-          <a:blip r:embed="rId3"/>
+          <a:blip r:embed="rId5"/>
           <a:srcRect l="21510" t="40579" r="2835" b="17838"/>
           <a:stretch>
             <a:fillRect/>
@@ -5988,6 +6006,11 @@
         </p:spPr>
       </p:pic>
     </p:spTree>
+    <p:extLst>
+      <p:ext uri="{BB962C8B-B14F-4D97-AF65-F5344CB8AC3E}">
+        <p14:creationId xmlns:p14="http://schemas.microsoft.com/office/powerpoint/2010/main" val="2582155256"/>
+      </p:ext>
+    </p:extLst>
   </p:cSld>
   <p:clrMapOvr>
     <a:masterClrMapping/>
@@ -6035,7 +6058,6 @@
               <a:rPr lang="en-US" altLang="en-GB" dirty="0"/>
               <a:t>A113</a:t>
             </a:r>
-            <a:endParaRPr lang="en-US" altLang="en-GB" dirty="0"/>
           </a:p>
         </p:txBody>
       </p:sp>
@@ -6056,6 +6078,7 @@
           <a:p>
             <a:fld id="{E4D355CA-84B7-41B1-B164-8BB439CC7C6B}" type="slidenum">
               <a:rPr lang="en-GB" smtClean="0"/>
+              <a:t>3</a:t>
             </a:fld>
             <a:endParaRPr lang="en-GB" dirty="0"/>
           </a:p>
@@ -6070,7 +6093,7 @@
           <p:nvPr/>
         </p:nvPicPr>
         <p:blipFill>
-          <a:blip r:embed="rId1"/>
+          <a:blip r:embed="rId3"/>
           <a:srcRect l="39851" t="45136" r="297"/>
           <a:stretch>
             <a:fillRect/>
@@ -6095,7 +6118,7 @@
           <p:nvPr/>
         </p:nvPicPr>
         <p:blipFill>
-          <a:blip r:embed="rId2"/>
+          <a:blip r:embed="rId4"/>
           <a:srcRect l="40274" t="43036" r="556" b="882"/>
           <a:stretch>
             <a:fillRect/>
@@ -6164,7 +6187,6 @@
               <a:rPr lang="en-US" altLang="en-GB" dirty="0"/>
               <a:t>A113</a:t>
             </a:r>
-            <a:endParaRPr lang="en-US" altLang="en-GB" dirty="0"/>
           </a:p>
         </p:txBody>
       </p:sp>
@@ -6185,6 +6207,7 @@
           <a:p>
             <a:fld id="{E4D355CA-84B7-41B1-B164-8BB439CC7C6B}" type="slidenum">
               <a:rPr lang="en-GB" smtClean="0"/>
+              <a:t>4</a:t>
             </a:fld>
             <a:endParaRPr lang="en-GB" dirty="0"/>
           </a:p>
@@ -6199,7 +6222,7 @@
           <p:nvPr/>
         </p:nvPicPr>
         <p:blipFill>
-          <a:blip r:embed="rId1"/>
+          <a:blip r:embed="rId3"/>
           <a:srcRect l="24465" t="42678"/>
           <a:stretch>
             <a:fillRect/>
@@ -6224,7 +6247,7 @@
           <p:nvPr/>
         </p:nvPicPr>
         <p:blipFill>
-          <a:blip r:embed="rId2"/>
+          <a:blip r:embed="rId4"/>
           <a:srcRect l="32161" t="42075"/>
           <a:stretch>
             <a:fillRect/>
@@ -6293,7 +6316,6 @@
               <a:rPr lang="en-US" altLang="en-GB" dirty="0"/>
               <a:t>A113</a:t>
             </a:r>
-            <a:endParaRPr lang="en-US" altLang="en-GB" dirty="0"/>
           </a:p>
         </p:txBody>
       </p:sp>
@@ -6314,6 +6336,7 @@
           <a:p>
             <a:fld id="{E4D355CA-84B7-41B1-B164-8BB439CC7C6B}" type="slidenum">
               <a:rPr lang="en-GB" smtClean="0"/>
+              <a:t>5</a:t>
             </a:fld>
             <a:endParaRPr lang="en-GB" dirty="0"/>
           </a:p>
@@ -6328,7 +6351,7 @@
           <p:nvPr/>
         </p:nvPicPr>
         <p:blipFill>
-          <a:blip r:embed="rId1"/>
+          <a:blip r:embed="rId3"/>
           <a:srcRect l="24130" t="42678"/>
           <a:stretch>
             <a:fillRect/>
@@ -6730,6 +6753,7 @@
                 </a:solidFill>
                 <a:latin typeface="Arial"/>
               </a:rPr>
+              <a:t>6</a:t>
             </a:fld>
             <a:endParaRPr lang="en-US" sz="1100" b="0" strike="noStrike" spc="-1">
               <a:latin typeface="Times New Roman"/>
@@ -7155,7 +7179,7 @@
           <p:nvPr/>
         </p:nvPicPr>
         <p:blipFill>
-          <a:blip r:embed="rId1"/>
+          <a:blip r:embed="rId3"/>
           <a:srcRect l="40192" t="42969" r="3258" b="3038"/>
           <a:stretch>
             <a:fillRect/>
@@ -7557,6 +7581,7 @@
                 </a:solidFill>
                 <a:latin typeface="Arial"/>
               </a:rPr>
+              <a:t>7</a:t>
             </a:fld>
             <a:endParaRPr lang="en-US" sz="1100" b="0" strike="noStrike" spc="-1">
               <a:latin typeface="Times New Roman"/>
@@ -7992,7 +8017,7 @@
           <p:nvPr/>
         </p:nvPicPr>
         <p:blipFill>
-          <a:blip r:embed="rId1"/>
+          <a:blip r:embed="rId2"/>
           <a:srcRect l="32414" t="43025" r="3340" b="4334"/>
           <a:stretch>
             <a:fillRect/>
@@ -8115,6 +8140,7 @@
                 </a:solidFill>
                 <a:latin typeface="Arial"/>
               </a:rPr>
+              <a:t>8</a:t>
             </a:fld>
             <a:endParaRPr lang="en-US" sz="1500" b="0" strike="noStrike" spc="-1">
               <a:latin typeface="Times New Roman"/>
@@ -8223,7 +8249,6 @@
               <a:rPr lang="en-US" altLang="en-GB" sz="3600" dirty="0"/>
               <a:t>R-code :</a:t>
             </a:r>
-            <a:endParaRPr lang="en-US" altLang="en-GB" sz="3600" dirty="0"/>
           </a:p>
           <a:p>
             <a:pPr marL="285750" indent="-285750">
@@ -8234,7 +8259,6 @@
               <a:rPr lang="en-US" altLang="en-GB" sz="3600" dirty="0"/>
               <a:t>spearman_result &lt;- cor.test(data_long$Month, data_long$Avg_Fund_Allocation, method = "spearman")</a:t>
             </a:r>
-            <a:endParaRPr lang="en-US" altLang="en-GB" sz="3600" dirty="0"/>
           </a:p>
         </p:txBody>
       </p:sp>
@@ -8345,6 +8369,7 @@
                 </a:solidFill>
                 <a:latin typeface="Arial"/>
               </a:rPr>
+              <a:t>9</a:t>
             </a:fld>
             <a:endParaRPr lang="en-US" sz="1500" b="0" strike="noStrike" spc="-1">
               <a:latin typeface="Times New Roman"/>
@@ -8455,9 +8480,6 @@
               </a:rPr>
               <a:t>Test-Statistic value = 220069524</a:t>
             </a:r>
-            <a:endParaRPr lang="en-US" altLang="en-US" sz="2000" dirty="0">
-              <a:sym typeface="+mn-ea"/>
-            </a:endParaRPr>
           </a:p>
           <a:p>
             <a:pPr marL="285750" indent="-285750">
@@ -8470,9 +8492,6 @@
               </a:rPr>
               <a:t>p-value = 0.6437</a:t>
             </a:r>
-            <a:endParaRPr lang="en-US" altLang="en-US" sz="2000" dirty="0">
-              <a:sym typeface="+mn-ea"/>
-            </a:endParaRPr>
           </a:p>
           <a:p>
             <a:pPr marL="285750" indent="-285750">
@@ -8483,7 +8502,6 @@
               <a:rPr lang="en-US" altLang="en-US" sz="2000" dirty="0"/>
               <a:t>The value of p-value (0.6437) is greater than 0.05, the result is not significant means there is no statistically significant correlation between the Month and Avg_Fund_Allocation.</a:t>
             </a:r>
-            <a:endParaRPr lang="en-US" altLang="en-US" sz="2000" dirty="0"/>
           </a:p>
           <a:p>
             <a:pPr marL="285750" indent="-285750">
@@ -8496,9 +8514,6 @@
               </a:rPr>
               <a:t>The p-value is greater than 0.05, we fail to reject the null hypothesis.</a:t>
             </a:r>
-            <a:endParaRPr lang="en-US" altLang="en-US" sz="2000" dirty="0">
-              <a:sym typeface="+mn-ea"/>
-            </a:endParaRPr>
           </a:p>
           <a:p>
             <a:pPr marL="285750" indent="-285750">
@@ -8511,9 +8526,6 @@
               </a:rPr>
               <a:t>The result Suggest that there is no monotonic relationship between the Month variable (which represents time) and the Average Fund Allocation. </a:t>
             </a:r>
-            <a:endParaRPr lang="en-US" altLang="en-US" sz="2000" dirty="0">
-              <a:sym typeface="+mn-ea"/>
-            </a:endParaRPr>
           </a:p>
         </p:txBody>
       </p:sp>
@@ -8776,6 +8788,8 @@
       </a:bgFillStyleLst>
     </a:fmtScheme>
   </a:themeElements>
+  <a:objectDefaults/>
+  <a:extraClrSchemeLst/>
   <a:extLst>
     <a:ext uri="{05A4C25C-085E-4340-85A3-A5531E510DB2}">
       <thm15:themeFamily xmlns:thm15="http://schemas.microsoft.com/office/thememl/2012/main" name="Office Theme" id="{62F939B6-93AF-4DB8-9C6B-D6C7DFDC589F}" vid="{4A3C46E8-61CC-4603-A589-7422A47A8E4A}"/>
@@ -9035,6 +9049,8 @@
       </a:bgFillStyleLst>
     </a:fmtScheme>
   </a:themeElements>
+  <a:objectDefaults/>
+  <a:extraClrSchemeLst/>
   <a:extLst>
     <a:ext uri="{05A4C25C-085E-4340-85A3-A5531E510DB2}">
       <thm15:themeFamily xmlns:thm15="http://schemas.microsoft.com/office/thememl/2012/main" name="Office Theme" id="{62F939B6-93AF-4DB8-9C6B-D6C7DFDC589F}" vid="{4A3C46E8-61CC-4603-A589-7422A47A8E4A}"/>
@@ -9294,6 +9310,8 @@
       </a:bgFillStyleLst>
     </a:fmtScheme>
   </a:themeElements>
+  <a:objectDefaults/>
+  <a:extraClrSchemeLst/>
   <a:extLst>
     <a:ext uri="{05A4C25C-085E-4340-85A3-A5531E510DB2}">
       <thm15:themeFamily xmlns:thm15="http://schemas.microsoft.com/office/thememl/2012/main" name="Office Theme" id="{62F939B6-93AF-4DB8-9C6B-D6C7DFDC589F}" vid="{4A3C46E8-61CC-4603-A589-7422A47A8E4A}"/>

</xml_diff>

<commit_message>
Visulation and analysis update mohit
</commit_message>
<xml_diff>
--- a/Vis_and_analysis_assignment.pptx
+++ b/Vis_and_analysis_assignment.pptx
@@ -13,7 +13,7 @@
   <p:sldIdLst>
     <p:sldId id="289" r:id="rId2"/>
     <p:sldId id="357" r:id="rId3"/>
-    <p:sldId id="336" r:id="rId4"/>
+    <p:sldId id="358" r:id="rId4"/>
     <p:sldId id="340" r:id="rId5"/>
     <p:sldId id="339" r:id="rId6"/>
     <p:sldId id="260" r:id="rId7"/>
@@ -846,6 +846,11 @@
         </p:txBody>
       </p:sp>
     </p:spTree>
+    <p:extLst>
+      <p:ext uri="{BB962C8B-B14F-4D97-AF65-F5344CB8AC3E}">
+        <p14:creationId xmlns:p14="http://schemas.microsoft.com/office/powerpoint/2010/main" val="1806677460"/>
+      </p:ext>
+    </p:extLst>
   </p:cSld>
   <p:clrMapOvr>
     <a:masterClrMapping/>
@@ -4910,6 +4915,10 @@
               <a:rPr lang="en-US" sz="2200" dirty="0"/>
               <a:t>Date: </a:t>
             </a:r>
+            <a:r>
+              <a:rPr lang="en-US" sz="8000" dirty="0"/>
+              <a:t/>
+            </a:r>
             <a:br>
               <a:rPr lang="en-US" sz="8000" dirty="0"/>
             </a:br>
@@ -5748,6 +5757,16 @@
             </a:endParaRPr>
           </a:p>
           <a:p>
+            <a:r>
+              <a:rPr lang="en-US" sz="2400" b="0" dirty="0">
+                <a:solidFill>
+                  <a:srgbClr val="FF0000"/>
+                </a:solidFill>
+                <a:latin typeface="Calibri" panose="020F0502020204030204" pitchFamily="34" charset="0"/>
+                <a:cs typeface="Calibri" panose="020F0502020204030204" pitchFamily="34" charset="0"/>
+              </a:rPr>
+              <a:t/>
+            </a:r>
             <a:br>
               <a:rPr lang="en-US" sz="2400" b="0" dirty="0">
                 <a:solidFill>
@@ -6135,6 +6154,11 @@
         </p:spPr>
       </p:pic>
     </p:spTree>
+    <p:extLst>
+      <p:ext uri="{BB962C8B-B14F-4D97-AF65-F5344CB8AC3E}">
+        <p14:creationId xmlns:p14="http://schemas.microsoft.com/office/powerpoint/2010/main" val="1263902789"/>
+      </p:ext>
+    </p:extLst>
   </p:cSld>
   <p:clrMapOvr>
     <a:masterClrMapping/>
@@ -6645,6 +6669,15 @@
                 <a:latin typeface="Arial"/>
               </a:rPr>
             </a:br>
+            <a:r>
+              <a:rPr lang="en-US" sz="2400" b="0" strike="noStrike" spc="-202">
+                <a:solidFill>
+                  <a:srgbClr val="FFFFFF"/>
+                </a:solidFill>
+                <a:latin typeface="Arial"/>
+              </a:rPr>
+              <a:t/>
+            </a:r>
             <a:br>
               <a:rPr lang="en-US" sz="2400" b="0" strike="noStrike" spc="-202">
                 <a:solidFill>
@@ -7473,6 +7506,15 @@
                 <a:latin typeface="Arial"/>
               </a:rPr>
             </a:br>
+            <a:r>
+              <a:rPr lang="en-US" sz="2400" b="0" strike="noStrike" spc="-202">
+                <a:solidFill>
+                  <a:srgbClr val="FFFFFF"/>
+                </a:solidFill>
+                <a:latin typeface="Arial"/>
+              </a:rPr>
+              <a:t/>
+            </a:r>
             <a:br>
               <a:rPr lang="en-US" sz="2400" b="0" strike="noStrike" spc="-202">
                 <a:solidFill>

</xml_diff>

<commit_message>
visualization and analysis update samar
</commit_message>
<xml_diff>
--- a/Vis_and_analysis_assignment.pptx
+++ b/Vis_and_analysis_assignment.pptx
@@ -14,7 +14,7 @@
     <p:sldId id="289" r:id="rId2"/>
     <p:sldId id="357" r:id="rId3"/>
     <p:sldId id="358" r:id="rId4"/>
-    <p:sldId id="340" r:id="rId5"/>
+    <p:sldId id="359" r:id="rId5"/>
     <p:sldId id="339" r:id="rId6"/>
     <p:sldId id="260" r:id="rId7"/>
     <p:sldId id="259" r:id="rId8"/>
@@ -312,6 +312,11 @@
         </p:txBody>
       </p:sp>
     </p:spTree>
+    <p:extLst>
+      <p:ext uri="{BB962C8B-B14F-4D97-AF65-F5344CB8AC3E}">
+        <p14:creationId xmlns:p14="http://schemas.microsoft.com/office/powerpoint/2010/main" val="1"/>
+      </p:ext>
+    </p:extLst>
   </p:cSld>
   <p:clrMap bg1="lt1" tx1="dk1" bg2="lt2" tx2="dk2" accent1="accent1" accent2="accent2" accent3="accent3" accent4="accent4" accent5="accent5" accent6="accent6" hlink="hlink" folHlink="folHlink"/>
 </p:handoutMaster>
@@ -863,7 +868,13 @@
   <p:cSld>
     <p:spTree>
       <p:nvGrpSpPr>
-        <p:cNvPr id="1" name=""/>
+        <p:cNvPr id="1" name="">
+          <a:extLst>
+            <a:ext uri="{FF2B5EF4-FFF2-40B4-BE49-F238E27FC236}">
+              <a16:creationId xmlns:a16="http://schemas.microsoft.com/office/drawing/2014/main" id="{FA5405A9-D3C2-B7AD-2BC6-3590BC61E744}"/>
+            </a:ext>
+          </a:extLst>
+        </p:cNvPr>
         <p:cNvGrpSpPr/>
         <p:nvPr/>
       </p:nvGrpSpPr>
@@ -877,7 +888,13 @@
       </p:grpSpPr>
       <p:sp>
         <p:nvSpPr>
-          <p:cNvPr id="2" name="Slide Image Placeholder 1"/>
+          <p:cNvPr id="2" name="Slide Image Placeholder 1">
+            <a:extLst>
+              <a:ext uri="{FF2B5EF4-FFF2-40B4-BE49-F238E27FC236}">
+                <a16:creationId xmlns:a16="http://schemas.microsoft.com/office/drawing/2014/main" id="{0F8BBEB3-AAED-4334-860F-95F848FBF6A2}"/>
+              </a:ext>
+            </a:extLst>
+          </p:cNvPr>
           <p:cNvSpPr>
             <a:spLocks noGrp="1" noRot="1" noChangeAspect="1"/>
           </p:cNvSpPr>
@@ -889,7 +906,13 @@
       </p:sp>
       <p:sp>
         <p:nvSpPr>
-          <p:cNvPr id="3" name="Notes Placeholder 2"/>
+          <p:cNvPr id="3" name="Notes Placeholder 2">
+            <a:extLst>
+              <a:ext uri="{FF2B5EF4-FFF2-40B4-BE49-F238E27FC236}">
+                <a16:creationId xmlns:a16="http://schemas.microsoft.com/office/drawing/2014/main" id="{82293F45-3D5B-1C77-209A-A83B9D39580F}"/>
+              </a:ext>
+            </a:extLst>
+          </p:cNvPr>
           <p:cNvSpPr>
             <a:spLocks noGrp="1"/>
           </p:cNvSpPr>
@@ -908,7 +931,13 @@
       </p:sp>
       <p:sp>
         <p:nvSpPr>
-          <p:cNvPr id="4" name="Slide Number Placeholder 3"/>
+          <p:cNvPr id="4" name="Slide Number Placeholder 3">
+            <a:extLst>
+              <a:ext uri="{FF2B5EF4-FFF2-40B4-BE49-F238E27FC236}">
+                <a16:creationId xmlns:a16="http://schemas.microsoft.com/office/drawing/2014/main" id="{6BDF9514-90F9-D472-9AE4-5B6CEB2BC490}"/>
+              </a:ext>
+            </a:extLst>
+          </p:cNvPr>
           <p:cNvSpPr>
             <a:spLocks noGrp="1"/>
           </p:cNvSpPr>
@@ -930,6 +959,11 @@
         </p:txBody>
       </p:sp>
     </p:spTree>
+    <p:extLst>
+      <p:ext uri="{BB962C8B-B14F-4D97-AF65-F5344CB8AC3E}">
+        <p14:creationId xmlns:p14="http://schemas.microsoft.com/office/powerpoint/2010/main" val="935695392"/>
+      </p:ext>
+    </p:extLst>
   </p:cSld>
   <p:clrMapOvr>
     <a:masterClrMapping/>
@@ -4915,10 +4949,6 @@
               <a:rPr lang="en-US" sz="2200" dirty="0"/>
               <a:t>Date: </a:t>
             </a:r>
-            <a:r>
-              <a:rPr lang="en-US" sz="8000" dirty="0"/>
-              <a:t/>
-            </a:r>
             <a:br>
               <a:rPr lang="en-US" sz="8000" dirty="0"/>
             </a:br>
@@ -5757,16 +5787,6 @@
             </a:endParaRPr>
           </a:p>
           <a:p>
-            <a:r>
-              <a:rPr lang="en-US" sz="2400" b="0" dirty="0">
-                <a:solidFill>
-                  <a:srgbClr val="FF0000"/>
-                </a:solidFill>
-                <a:latin typeface="Calibri" panose="020F0502020204030204" pitchFamily="34" charset="0"/>
-                <a:cs typeface="Calibri" panose="020F0502020204030204" pitchFamily="34" charset="0"/>
-              </a:rPr>
-              <a:t/>
-            </a:r>
             <a:br>
               <a:rPr lang="en-US" sz="2400" b="0" dirty="0">
                 <a:solidFill>
@@ -6171,7 +6191,13 @@
   <p:cSld>
     <p:spTree>
       <p:nvGrpSpPr>
-        <p:cNvPr id="1" name=""/>
+        <p:cNvPr id="1" name="">
+          <a:extLst>
+            <a:ext uri="{FF2B5EF4-FFF2-40B4-BE49-F238E27FC236}">
+              <a16:creationId xmlns:a16="http://schemas.microsoft.com/office/drawing/2014/main" id="{41A7862A-A984-D8A5-1BBC-F0B3E475B17D}"/>
+            </a:ext>
+          </a:extLst>
+        </p:cNvPr>
         <p:cNvGrpSpPr/>
         <p:nvPr/>
       </p:nvGrpSpPr>
@@ -6185,7 +6211,13 @@
       </p:grpSpPr>
       <p:sp>
         <p:nvSpPr>
-          <p:cNvPr id="3" name="Footer Placeholder 2"/>
+          <p:cNvPr id="3" name="Footer Placeholder 2">
+            <a:extLst>
+              <a:ext uri="{FF2B5EF4-FFF2-40B4-BE49-F238E27FC236}">
+                <a16:creationId xmlns:a16="http://schemas.microsoft.com/office/drawing/2014/main" id="{18997380-5D24-BDF7-A346-0D7A7C66F023}"/>
+              </a:ext>
+            </a:extLst>
+          </p:cNvPr>
           <p:cNvSpPr>
             <a:spLocks noGrp="1"/>
           </p:cNvSpPr>
@@ -6216,7 +6248,13 @@
       </p:sp>
       <p:sp>
         <p:nvSpPr>
-          <p:cNvPr id="4" name="Slide Number Placeholder 3"/>
+          <p:cNvPr id="4" name="Slide Number Placeholder 3">
+            <a:extLst>
+              <a:ext uri="{FF2B5EF4-FFF2-40B4-BE49-F238E27FC236}">
+                <a16:creationId xmlns:a16="http://schemas.microsoft.com/office/drawing/2014/main" id="{DB493747-75AF-C0EA-3068-FC324ADB5938}"/>
+              </a:ext>
+            </a:extLst>
+          </p:cNvPr>
           <p:cNvSpPr>
             <a:spLocks noGrp="1"/>
           </p:cNvSpPr>
@@ -6239,7 +6277,13 @@
       </p:sp>
       <p:pic>
         <p:nvPicPr>
-          <p:cNvPr id="2" name="Picture 1" descr="Screenshot from 2024-11-14 23-06-54"/>
+          <p:cNvPr id="2" name="Picture 1" descr="Screenshot from 2024-11-14 23-06-54">
+            <a:extLst>
+              <a:ext uri="{FF2B5EF4-FFF2-40B4-BE49-F238E27FC236}">
+                <a16:creationId xmlns:a16="http://schemas.microsoft.com/office/drawing/2014/main" id="{CFE4F31A-C237-45DB-8F4A-B392269D27CC}"/>
+              </a:ext>
+            </a:extLst>
+          </p:cNvPr>
           <p:cNvPicPr>
             <a:picLocks noChangeAspect="1"/>
           </p:cNvPicPr>
@@ -6264,7 +6308,13 @@
       </p:pic>
       <p:pic>
         <p:nvPicPr>
-          <p:cNvPr id="5" name="Picture 4" descr="Screenshot from 2024-11-14 23-25-00"/>
+          <p:cNvPr id="5" name="Picture 4" descr="Screenshot from 2024-11-14 23-25-00">
+            <a:extLst>
+              <a:ext uri="{FF2B5EF4-FFF2-40B4-BE49-F238E27FC236}">
+                <a16:creationId xmlns:a16="http://schemas.microsoft.com/office/drawing/2014/main" id="{D901F399-9D4C-CC65-E91C-C262416627A1}"/>
+              </a:ext>
+            </a:extLst>
+          </p:cNvPr>
           <p:cNvPicPr>
             <a:picLocks noChangeAspect="1"/>
           </p:cNvPicPr>
@@ -6288,6 +6338,11 @@
         </p:spPr>
       </p:pic>
     </p:spTree>
+    <p:extLst>
+      <p:ext uri="{BB962C8B-B14F-4D97-AF65-F5344CB8AC3E}">
+        <p14:creationId xmlns:p14="http://schemas.microsoft.com/office/powerpoint/2010/main" val="3796487209"/>
+      </p:ext>
+    </p:extLst>
   </p:cSld>
   <p:clrMapOvr>
     <a:masterClrMapping/>
@@ -6669,15 +6724,6 @@
                 <a:latin typeface="Arial"/>
               </a:rPr>
             </a:br>
-            <a:r>
-              <a:rPr lang="en-US" sz="2400" b="0" strike="noStrike" spc="-202">
-                <a:solidFill>
-                  <a:srgbClr val="FFFFFF"/>
-                </a:solidFill>
-                <a:latin typeface="Arial"/>
-              </a:rPr>
-              <a:t/>
-            </a:r>
             <a:br>
               <a:rPr lang="en-US" sz="2400" b="0" strike="noStrike" spc="-202">
                 <a:solidFill>
@@ -7506,15 +7552,6 @@
                 <a:latin typeface="Arial"/>
               </a:rPr>
             </a:br>
-            <a:r>
-              <a:rPr lang="en-US" sz="2400" b="0" strike="noStrike" spc="-202">
-                <a:solidFill>
-                  <a:srgbClr val="FFFFFF"/>
-                </a:solidFill>
-                <a:latin typeface="Arial"/>
-              </a:rPr>
-              <a:t/>
-            </a:r>
             <a:br>
               <a:rPr lang="en-US" sz="2400" b="0" strike="noStrike" spc="-202">
                 <a:solidFill>

</xml_diff>

<commit_message>
visulization and analysis update Fahad
</commit_message>
<xml_diff>
--- a/Vis_and_analysis_assignment.pptx
+++ b/Vis_and_analysis_assignment.pptx
@@ -17,8 +17,8 @@
     <p:sldId id="359" r:id="rId5"/>
     <p:sldId id="339" r:id="rId6"/>
     <p:sldId id="260" r:id="rId7"/>
-    <p:sldId id="259" r:id="rId8"/>
-    <p:sldId id="353" r:id="rId9"/>
+    <p:sldId id="360" r:id="rId8"/>
+    <p:sldId id="361" r:id="rId9"/>
     <p:sldId id="356" r:id="rId10"/>
     <p:sldId id="351" r:id="rId11"/>
     <p:sldId id="352" r:id="rId12"/>
@@ -122,7 +122,7 @@
   </p:defaultTextStyle>
   <p:extLst>
     <p:ext uri="{EFAFB233-063F-42B5-8137-9DF3F51BA10A}">
-      <p15:sldGuideLst xmlns:p15="http://schemas.microsoft.com/office/powerpoint/2012/main">
+      <p15:sldGuideLst xmlns="" xmlns:p15="http://schemas.microsoft.com/office/powerpoint/2012/main">
         <p15:guide id="1" orient="horz" pos="2158">
           <p15:clr>
             <a:srgbClr val="A4A3A4"/>
@@ -151,7 +151,7 @@
       </p15:sldGuideLst>
     </p:ext>
     <p:ext uri="{2D200454-40CA-4A62-9FC3-DE9A4176ACB9}">
-      <p15:notesGuideLst xmlns:p15="http://schemas.microsoft.com/office/powerpoint/2012/main"/>
+      <p15:notesGuideLst xmlns="" xmlns:p15="http://schemas.microsoft.com/office/powerpoint/2012/main"/>
     </p:ext>
   </p:extLst>
 </p:presentation>
@@ -239,7 +239,8 @@
           <a:p>
             <a:fld id="{93FAAC3A-BD1F-4A00-9099-74B95789FE00}" type="datetimeFigureOut">
               <a:rPr lang="en-GB" smtClean="0"/>
-              <a:t>16/11/2024</a:t>
+              <a:pPr/>
+              <a:t>18/11/2024</a:t>
             </a:fld>
             <a:endParaRPr lang="en-GB"/>
           </a:p>
@@ -305,6 +306,7 @@
           <a:p>
             <a:fld id="{C29F51D9-0FEB-436E-9280-D6033F603547}" type="slidenum">
               <a:rPr lang="en-GB" smtClean="0"/>
+              <a:pPr/>
               <a:t>‹#›</a:t>
             </a:fld>
             <a:endParaRPr lang="en-GB"/>
@@ -314,40 +316,12 @@
     </p:spTree>
     <p:extLst>
       <p:ext uri="{BB962C8B-B14F-4D97-AF65-F5344CB8AC3E}">
-        <p14:creationId xmlns:p14="http://schemas.microsoft.com/office/powerpoint/2010/main" val="1"/>
+        <p14:creationId xmlns="" xmlns:p14="http://schemas.microsoft.com/office/powerpoint/2010/main" val="1"/>
       </p:ext>
     </p:extLst>
   </p:cSld>
   <p:clrMap bg1="lt1" tx1="dk1" bg2="lt2" tx2="dk2" accent1="accent1" accent2="accent2" accent3="accent3" accent4="accent4" accent5="accent5" accent6="accent6" hlink="hlink" folHlink="folHlink"/>
 </p:handoutMaster>
-</file>
-
-<file path=ppt/ink/ink1.xml><?xml version="1.0" encoding="utf-8"?>
-<inkml:ink xmlns:inkml="http://www.w3.org/2003/InkML">
-  <inkml:definitions>
-    <inkml:context xml:id="ctx0">
-      <inkml:inkSource xml:id="inkSrc0">
-        <inkml:traceFormat>
-          <inkml:channel name="X" type="integer" min="-2" max="2" units="cm"/>
-          <inkml:channel name="Y" type="integer" min="-2" max="2" units="cm"/>
-          <inkml:channel name="F" type="integer" max="1023" units="cm"/>
-        </inkml:traceFormat>
-        <inkml:channelProperties>
-          <inkml:channelProperty channel="X" name="resolution" value="1000" units="1/cm"/>
-          <inkml:channelProperty channel="Y" name="resolution" value="1000" units="1/cm"/>
-          <inkml:channelProperty channel="F" name="resolution" value="2.84167" units="1/cm"/>
-        </inkml:channelProperties>
-      </inkml:inkSource>
-      <inkml:timestamp xml:id="ts0" timeString="2022-11-23T12:25:27"/>
-    </inkml:context>
-    <inkml:brush xml:id="br0">
-      <inkml:brushProperty name="width" value="0.1" units="cm"/>
-      <inkml:brushProperty name="height" value="0.1" units="cm"/>
-      <inkml:brushProperty name="color" value="#E71224"/>
-    </inkml:brush>
-  </inkml:definitions>
-  <inkml:trace contextRef="#ctx0" brushRef="#br0">0 0 24575,'0'0'-8191</inkml:trace>
-</inkml:ink>
 </file>
 
 <file path=ppt/notesMasters/notesMaster1.xml><?xml version="1.0" encoding="utf-8"?>
@@ -432,7 +406,8 @@
           <a:p>
             <a:fld id="{8E359C8A-39F6-4045-9163-4042C4C26B15}" type="datetimeFigureOut">
               <a:rPr lang="en-GB" smtClean="0"/>
-              <a:t>16/11/2024</a:t>
+              <a:pPr/>
+              <a:t>18/11/2024</a:t>
             </a:fld>
             <a:endParaRPr lang="en-GB"/>
           </a:p>
@@ -591,6 +566,7 @@
           <a:p>
             <a:fld id="{30370952-48CC-46D7-9FCD-59FAD40CC025}" type="slidenum">
               <a:rPr lang="en-GB" smtClean="0"/>
+              <a:pPr/>
               <a:t>‹#›</a:t>
             </a:fld>
             <a:endParaRPr lang="en-GB"/>
@@ -760,7 +736,8 @@
           <a:p>
             <a:fld id="{30370952-48CC-46D7-9FCD-59FAD40CC025}" type="slidenum">
               <a:rPr lang="en-GB" smtClean="0"/>
-              <a:t>2</a:t>
+              <a:pPr/>
+              <a:t>3</a:t>
             </a:fld>
             <a:endParaRPr lang="en-GB"/>
           </a:p>
@@ -769,7 +746,7 @@
     </p:spTree>
     <p:extLst>
       <p:ext uri="{BB962C8B-B14F-4D97-AF65-F5344CB8AC3E}">
-        <p14:creationId xmlns:p14="http://schemas.microsoft.com/office/powerpoint/2010/main" val="3780942166"/>
+        <p14:creationId xmlns="" xmlns:p14="http://schemas.microsoft.com/office/powerpoint/2010/main" val="1806677460"/>
       </p:ext>
     </p:extLst>
   </p:cSld>
@@ -780,6 +757,115 @@
 </file>
 
 <file path=ppt/notesSlides/notesSlide2.xml><?xml version="1.0" encoding="utf-8"?>
+<p:notes xmlns:a="http://schemas.openxmlformats.org/drawingml/2006/main" xmlns:r="http://schemas.openxmlformats.org/officeDocument/2006/relationships" xmlns:p="http://schemas.openxmlformats.org/presentationml/2006/main">
+  <p:cSld>
+    <p:spTree>
+      <p:nvGrpSpPr>
+        <p:cNvPr id="1" name="">
+          <a:extLst>
+            <a:ext uri="{FF2B5EF4-FFF2-40B4-BE49-F238E27FC236}">
+              <a16:creationId xmlns="" xmlns:a16="http://schemas.microsoft.com/office/drawing/2014/main" id="{FA5405A9-D3C2-B7AD-2BC6-3590BC61E744}"/>
+            </a:ext>
+          </a:extLst>
+        </p:cNvPr>
+        <p:cNvGrpSpPr/>
+        <p:nvPr/>
+      </p:nvGrpSpPr>
+      <p:grpSpPr>
+        <a:xfrm>
+          <a:off x="0" y="0"/>
+          <a:ext cx="0" cy="0"/>
+          <a:chOff x="0" y="0"/>
+          <a:chExt cx="0" cy="0"/>
+        </a:xfrm>
+      </p:grpSpPr>
+      <p:sp>
+        <p:nvSpPr>
+          <p:cNvPr id="2" name="Slide Image Placeholder 1">
+            <a:extLst>
+              <a:ext uri="{FF2B5EF4-FFF2-40B4-BE49-F238E27FC236}">
+                <a16:creationId xmlns="" xmlns:a16="http://schemas.microsoft.com/office/drawing/2014/main" id="{0F8BBEB3-AAED-4334-860F-95F848FBF6A2}"/>
+              </a:ext>
+            </a:extLst>
+          </p:cNvPr>
+          <p:cNvSpPr>
+            <a:spLocks noGrp="1" noRot="1" noChangeAspect="1"/>
+          </p:cNvSpPr>
+          <p:nvPr>
+            <p:ph type="sldImg"/>
+          </p:nvPr>
+        </p:nvSpPr>
+        <p:spPr/>
+      </p:sp>
+      <p:sp>
+        <p:nvSpPr>
+          <p:cNvPr id="3" name="Notes Placeholder 2">
+            <a:extLst>
+              <a:ext uri="{FF2B5EF4-FFF2-40B4-BE49-F238E27FC236}">
+                <a16:creationId xmlns="" xmlns:a16="http://schemas.microsoft.com/office/drawing/2014/main" id="{82293F45-3D5B-1C77-209A-A83B9D39580F}"/>
+              </a:ext>
+            </a:extLst>
+          </p:cNvPr>
+          <p:cNvSpPr>
+            <a:spLocks noGrp="1"/>
+          </p:cNvSpPr>
+          <p:nvPr>
+            <p:ph type="body" idx="1"/>
+          </p:nvPr>
+        </p:nvSpPr>
+        <p:spPr/>
+        <p:txBody>
+          <a:bodyPr/>
+          <a:lstStyle/>
+          <a:p>
+            <a:endParaRPr lang="en-GB" dirty="0"/>
+          </a:p>
+        </p:txBody>
+      </p:sp>
+      <p:sp>
+        <p:nvSpPr>
+          <p:cNvPr id="4" name="Slide Number Placeholder 3">
+            <a:extLst>
+              <a:ext uri="{FF2B5EF4-FFF2-40B4-BE49-F238E27FC236}">
+                <a16:creationId xmlns="" xmlns:a16="http://schemas.microsoft.com/office/drawing/2014/main" id="{6BDF9514-90F9-D472-9AE4-5B6CEB2BC490}"/>
+              </a:ext>
+            </a:extLst>
+          </p:cNvPr>
+          <p:cNvSpPr>
+            <a:spLocks noGrp="1"/>
+          </p:cNvSpPr>
+          <p:nvPr>
+            <p:ph type="sldNum" sz="quarter" idx="5"/>
+          </p:nvPr>
+        </p:nvSpPr>
+        <p:spPr/>
+        <p:txBody>
+          <a:bodyPr/>
+          <a:lstStyle/>
+          <a:p>
+            <a:fld id="{30370952-48CC-46D7-9FCD-59FAD40CC025}" type="slidenum">
+              <a:rPr lang="en-GB" smtClean="0"/>
+              <a:pPr/>
+              <a:t>4</a:t>
+            </a:fld>
+            <a:endParaRPr lang="en-GB"/>
+          </a:p>
+        </p:txBody>
+      </p:sp>
+    </p:spTree>
+    <p:extLst>
+      <p:ext uri="{BB962C8B-B14F-4D97-AF65-F5344CB8AC3E}">
+        <p14:creationId xmlns="" xmlns:p14="http://schemas.microsoft.com/office/powerpoint/2010/main" val="935695392"/>
+      </p:ext>
+    </p:extLst>
+  </p:cSld>
+  <p:clrMapOvr>
+    <a:masterClrMapping/>
+  </p:clrMapOvr>
+</p:notes>
+</file>
+
+<file path=ppt/notesSlides/notesSlide3.xml><?xml version="1.0" encoding="utf-8"?>
 <p:notes xmlns:a="http://schemas.openxmlformats.org/drawingml/2006/main" xmlns:r="http://schemas.openxmlformats.org/officeDocument/2006/relationships" xmlns:p="http://schemas.openxmlformats.org/presentationml/2006/main">
   <p:cSld>
     <p:spTree>
@@ -844,126 +930,14 @@
           <a:p>
             <a:fld id="{30370952-48CC-46D7-9FCD-59FAD40CC025}" type="slidenum">
               <a:rPr lang="en-GB" smtClean="0"/>
-              <a:t>3</a:t>
+              <a:pPr/>
+              <a:t>5</a:t>
             </a:fld>
             <a:endParaRPr lang="en-GB"/>
           </a:p>
         </p:txBody>
       </p:sp>
     </p:spTree>
-    <p:extLst>
-      <p:ext uri="{BB962C8B-B14F-4D97-AF65-F5344CB8AC3E}">
-        <p14:creationId xmlns:p14="http://schemas.microsoft.com/office/powerpoint/2010/main" val="1806677460"/>
-      </p:ext>
-    </p:extLst>
-  </p:cSld>
-  <p:clrMapOvr>
-    <a:masterClrMapping/>
-  </p:clrMapOvr>
-</p:notes>
-</file>
-
-<file path=ppt/notesSlides/notesSlide3.xml><?xml version="1.0" encoding="utf-8"?>
-<p:notes xmlns:a="http://schemas.openxmlformats.org/drawingml/2006/main" xmlns:r="http://schemas.openxmlformats.org/officeDocument/2006/relationships" xmlns:p="http://schemas.openxmlformats.org/presentationml/2006/main">
-  <p:cSld>
-    <p:spTree>
-      <p:nvGrpSpPr>
-        <p:cNvPr id="1" name="">
-          <a:extLst>
-            <a:ext uri="{FF2B5EF4-FFF2-40B4-BE49-F238E27FC236}">
-              <a16:creationId xmlns:a16="http://schemas.microsoft.com/office/drawing/2014/main" id="{FA5405A9-D3C2-B7AD-2BC6-3590BC61E744}"/>
-            </a:ext>
-          </a:extLst>
-        </p:cNvPr>
-        <p:cNvGrpSpPr/>
-        <p:nvPr/>
-      </p:nvGrpSpPr>
-      <p:grpSpPr>
-        <a:xfrm>
-          <a:off x="0" y="0"/>
-          <a:ext cx="0" cy="0"/>
-          <a:chOff x="0" y="0"/>
-          <a:chExt cx="0" cy="0"/>
-        </a:xfrm>
-      </p:grpSpPr>
-      <p:sp>
-        <p:nvSpPr>
-          <p:cNvPr id="2" name="Slide Image Placeholder 1">
-            <a:extLst>
-              <a:ext uri="{FF2B5EF4-FFF2-40B4-BE49-F238E27FC236}">
-                <a16:creationId xmlns:a16="http://schemas.microsoft.com/office/drawing/2014/main" id="{0F8BBEB3-AAED-4334-860F-95F848FBF6A2}"/>
-              </a:ext>
-            </a:extLst>
-          </p:cNvPr>
-          <p:cNvSpPr>
-            <a:spLocks noGrp="1" noRot="1" noChangeAspect="1"/>
-          </p:cNvSpPr>
-          <p:nvPr>
-            <p:ph type="sldImg"/>
-          </p:nvPr>
-        </p:nvSpPr>
-        <p:spPr/>
-      </p:sp>
-      <p:sp>
-        <p:nvSpPr>
-          <p:cNvPr id="3" name="Notes Placeholder 2">
-            <a:extLst>
-              <a:ext uri="{FF2B5EF4-FFF2-40B4-BE49-F238E27FC236}">
-                <a16:creationId xmlns:a16="http://schemas.microsoft.com/office/drawing/2014/main" id="{82293F45-3D5B-1C77-209A-A83B9D39580F}"/>
-              </a:ext>
-            </a:extLst>
-          </p:cNvPr>
-          <p:cNvSpPr>
-            <a:spLocks noGrp="1"/>
-          </p:cNvSpPr>
-          <p:nvPr>
-            <p:ph type="body" idx="1"/>
-          </p:nvPr>
-        </p:nvSpPr>
-        <p:spPr/>
-        <p:txBody>
-          <a:bodyPr/>
-          <a:lstStyle/>
-          <a:p>
-            <a:endParaRPr lang="en-GB" dirty="0"/>
-          </a:p>
-        </p:txBody>
-      </p:sp>
-      <p:sp>
-        <p:nvSpPr>
-          <p:cNvPr id="4" name="Slide Number Placeholder 3">
-            <a:extLst>
-              <a:ext uri="{FF2B5EF4-FFF2-40B4-BE49-F238E27FC236}">
-                <a16:creationId xmlns:a16="http://schemas.microsoft.com/office/drawing/2014/main" id="{6BDF9514-90F9-D472-9AE4-5B6CEB2BC490}"/>
-              </a:ext>
-            </a:extLst>
-          </p:cNvPr>
-          <p:cNvSpPr>
-            <a:spLocks noGrp="1"/>
-          </p:cNvSpPr>
-          <p:nvPr>
-            <p:ph type="sldNum" sz="quarter" idx="5"/>
-          </p:nvPr>
-        </p:nvSpPr>
-        <p:spPr/>
-        <p:txBody>
-          <a:bodyPr/>
-          <a:lstStyle/>
-          <a:p>
-            <a:fld id="{30370952-48CC-46D7-9FCD-59FAD40CC025}" type="slidenum">
-              <a:rPr lang="en-GB" smtClean="0"/>
-              <a:t>4</a:t>
-            </a:fld>
-            <a:endParaRPr lang="en-GB"/>
-          </a:p>
-        </p:txBody>
-      </p:sp>
-    </p:spTree>
-    <p:extLst>
-      <p:ext uri="{BB962C8B-B14F-4D97-AF65-F5344CB8AC3E}">
-        <p14:creationId xmlns:p14="http://schemas.microsoft.com/office/powerpoint/2010/main" val="935695392"/>
-      </p:ext>
-    </p:extLst>
   </p:cSld>
   <p:clrMapOvr>
     <a:masterClrMapping/>
@@ -990,7 +964,7 @@
       </p:grpSpPr>
       <p:sp>
         <p:nvSpPr>
-          <p:cNvPr id="2" name="Slide Image Placeholder 1"/>
+          <p:cNvPr id="142" name="PlaceHolder 1"/>
           <p:cNvSpPr>
             <a:spLocks noGrp="1" noRot="1" noChangeAspect="1"/>
           </p:cNvSpPr>
@@ -998,47 +972,91 @@
             <p:ph type="sldImg"/>
           </p:nvPr>
         </p:nvSpPr>
-        <p:spPr/>
-      </p:sp>
-      <p:sp>
-        <p:nvSpPr>
-          <p:cNvPr id="3" name="Notes Placeholder 2"/>
+        <p:spPr>
+          <a:xfrm>
+            <a:off x="685800" y="1143000"/>
+            <a:ext cx="5486400" cy="3086100"/>
+          </a:xfrm>
+          <a:prstGeom prst="rect">
+            <a:avLst/>
+          </a:prstGeom>
+        </p:spPr>
+      </p:sp>
+      <p:sp>
+        <p:nvSpPr>
+          <p:cNvPr id="143" name="PlaceHolder 2"/>
           <p:cNvSpPr>
             <a:spLocks noGrp="1"/>
           </p:cNvSpPr>
           <p:nvPr>
-            <p:ph type="body" idx="1"/>
+            <p:ph type="body"/>
           </p:nvPr>
         </p:nvSpPr>
-        <p:spPr/>
-        <p:txBody>
-          <a:bodyPr/>
-          <a:lstStyle/>
-          <a:p>
-            <a:endParaRPr lang="en-GB" dirty="0"/>
-          </a:p>
-        </p:txBody>
-      </p:sp>
-      <p:sp>
-        <p:nvSpPr>
-          <p:cNvPr id="4" name="Slide Number Placeholder 3"/>
-          <p:cNvSpPr>
-            <a:spLocks noGrp="1"/>
-          </p:cNvSpPr>
-          <p:nvPr>
-            <p:ph type="sldNum" sz="quarter" idx="5"/>
-          </p:nvPr>
-        </p:nvSpPr>
-        <p:spPr/>
-        <p:txBody>
-          <a:bodyPr/>
-          <a:lstStyle/>
-          <a:p>
-            <a:fld id="{30370952-48CC-46D7-9FCD-59FAD40CC025}" type="slidenum">
-              <a:rPr lang="en-GB" smtClean="0"/>
-              <a:t>5</a:t>
+        <p:spPr>
+          <a:xfrm>
+            <a:off x="685800" y="4400640"/>
+            <a:ext cx="5486040" cy="3600000"/>
+          </a:xfrm>
+          <a:prstGeom prst="rect">
+            <a:avLst/>
+          </a:prstGeom>
+        </p:spPr>
+        <p:txBody>
+          <a:bodyPr>
+            <a:noAutofit/>
+          </a:bodyPr>
+          <a:lstStyle/>
+          <a:p>
+            <a:endParaRPr lang="en-US" sz="2000" b="0" strike="noStrike" spc="-1">
+              <a:latin typeface="Arial"/>
+            </a:endParaRPr>
+          </a:p>
+        </p:txBody>
+      </p:sp>
+      <p:sp>
+        <p:nvSpPr>
+          <p:cNvPr id="144" name="TextShape 3"/>
+          <p:cNvSpPr txBox="1"/>
+          <p:nvPr/>
+        </p:nvSpPr>
+        <p:spPr>
+          <a:xfrm>
+            <a:off x="3884760" y="8685360"/>
+            <a:ext cx="2971440" cy="458280"/>
+          </a:xfrm>
+          <a:prstGeom prst="rect">
+            <a:avLst/>
+          </a:prstGeom>
+          <a:noFill/>
+          <a:ln>
+            <a:noFill/>
+          </a:ln>
+        </p:spPr>
+        <p:txBody>
+          <a:bodyPr anchor="b">
+            <a:noAutofit/>
+          </a:bodyPr>
+          <a:lstStyle/>
+          <a:p>
+            <a:pPr algn="r">
+              <a:lnSpc>
+                <a:spcPct val="100000"/>
+              </a:lnSpc>
+            </a:pPr>
+            <a:fld id="{F2152A03-473D-4693-94B3-2C4A26E4B7E1}" type="slidenum">
+              <a:rPr lang="en-GB" sz="1200" b="0" strike="noStrike" spc="-1">
+                <a:latin typeface="Times New Roman"/>
+              </a:rPr>
+              <a:pPr algn="r">
+                <a:lnSpc>
+                  <a:spcPct val="100000"/>
+                </a:lnSpc>
+              </a:pPr>
+              <a:t>6</a:t>
             </a:fld>
-            <a:endParaRPr lang="en-GB"/>
+            <a:endParaRPr lang="en-US" sz="1200" b="0" strike="noStrike" spc="-1">
+              <a:latin typeface="Times New Roman"/>
+            </a:endParaRPr>
           </a:p>
         </p:txBody>
       </p:sp>
@@ -1069,7 +1087,7 @@
       </p:grpSpPr>
       <p:sp>
         <p:nvSpPr>
-          <p:cNvPr id="142" name="PlaceHolder 1"/>
+          <p:cNvPr id="148" name="PlaceHolder 1"/>
           <p:cNvSpPr>
             <a:spLocks noGrp="1" noRot="1" noChangeAspect="1"/>
           </p:cNvSpPr>
@@ -1089,7 +1107,7 @@
       </p:sp>
       <p:sp>
         <p:nvSpPr>
-          <p:cNvPr id="143" name="PlaceHolder 2"/>
+          <p:cNvPr id="149" name="PlaceHolder 2"/>
           <p:cNvSpPr>
             <a:spLocks noGrp="1"/>
           </p:cNvSpPr>
@@ -1120,7 +1138,7 @@
       </p:sp>
       <p:sp>
         <p:nvSpPr>
-          <p:cNvPr id="144" name="TextShape 3"/>
+          <p:cNvPr id="150" name="TextShape 3"/>
           <p:cNvSpPr txBox="1"/>
           <p:nvPr/>
         </p:nvSpPr>
@@ -1148,11 +1166,16 @@
                 <a:spcPct val="100000"/>
               </a:lnSpc>
             </a:pPr>
-            <a:fld id="{F2152A03-473D-4693-94B3-2C4A26E4B7E1}" type="slidenum">
+            <a:fld id="{677DA20C-D3E3-4F02-A624-D52A93CA4942}" type="slidenum">
               <a:rPr lang="en-GB" sz="1200" b="0" strike="noStrike" spc="-1">
                 <a:latin typeface="Times New Roman"/>
               </a:rPr>
-              <a:t>6</a:t>
+              <a:pPr algn="r">
+                <a:lnSpc>
+                  <a:spcPct val="100000"/>
+                </a:lnSpc>
+              </a:pPr>
+              <a:t>8</a:t>
             </a:fld>
             <a:endParaRPr lang="en-US" sz="1200" b="0" strike="noStrike" spc="-1">
               <a:latin typeface="Times New Roman"/>
@@ -1270,7 +1293,12 @@
               <a:rPr lang="en-GB" sz="1200" b="0" strike="noStrike" spc="-1">
                 <a:latin typeface="Times New Roman"/>
               </a:rPr>
-              <a:t>8</a:t>
+              <a:pPr algn="r">
+                <a:lnSpc>
+                  <a:spcPct val="100000"/>
+                </a:lnSpc>
+              </a:pPr>
+              <a:t>9</a:t>
             </a:fld>
             <a:endParaRPr lang="en-US" sz="1200" b="0" strike="noStrike" spc="-1">
               <a:latin typeface="Times New Roman"/>
@@ -1388,7 +1416,12 @@
               <a:rPr lang="en-GB" sz="1200" b="0" strike="noStrike" spc="-1">
                 <a:latin typeface="Times New Roman"/>
               </a:rPr>
-              <a:t>9</a:t>
+              <a:pPr algn="r">
+                <a:lnSpc>
+                  <a:spcPct val="100000"/>
+                </a:lnSpc>
+              </a:pPr>
+              <a:t>10</a:t>
             </a:fld>
             <a:endParaRPr lang="en-US" sz="1200" b="0" strike="noStrike" spc="-1">
               <a:latin typeface="Times New Roman"/>
@@ -1506,124 +1539,11 @@
               <a:rPr lang="en-GB" sz="1200" b="0" strike="noStrike" spc="-1">
                 <a:latin typeface="Times New Roman"/>
               </a:rPr>
-              <a:t>10</a:t>
-            </a:fld>
-            <a:endParaRPr lang="en-US" sz="1200" b="0" strike="noStrike" spc="-1">
-              <a:latin typeface="Times New Roman"/>
-            </a:endParaRPr>
-          </a:p>
-        </p:txBody>
-      </p:sp>
-    </p:spTree>
-  </p:cSld>
-  <p:clrMapOvr>
-    <a:masterClrMapping/>
-  </p:clrMapOvr>
-</p:notes>
-</file>
-
-<file path=ppt/notesSlides/notesSlide9.xml><?xml version="1.0" encoding="utf-8"?>
-<p:notes xmlns:a="http://schemas.openxmlformats.org/drawingml/2006/main" xmlns:r="http://schemas.openxmlformats.org/officeDocument/2006/relationships" xmlns:p="http://schemas.openxmlformats.org/presentationml/2006/main">
-  <p:cSld>
-    <p:spTree>
-      <p:nvGrpSpPr>
-        <p:cNvPr id="1" name=""/>
-        <p:cNvGrpSpPr/>
-        <p:nvPr/>
-      </p:nvGrpSpPr>
-      <p:grpSpPr>
-        <a:xfrm>
-          <a:off x="0" y="0"/>
-          <a:ext cx="0" cy="0"/>
-          <a:chOff x="0" y="0"/>
-          <a:chExt cx="0" cy="0"/>
-        </a:xfrm>
-      </p:grpSpPr>
-      <p:sp>
-        <p:nvSpPr>
-          <p:cNvPr id="148" name="PlaceHolder 1"/>
-          <p:cNvSpPr>
-            <a:spLocks noGrp="1" noRot="1" noChangeAspect="1"/>
-          </p:cNvSpPr>
-          <p:nvPr>
-            <p:ph type="sldImg"/>
-          </p:nvPr>
-        </p:nvSpPr>
-        <p:spPr>
-          <a:xfrm>
-            <a:off x="685800" y="1143000"/>
-            <a:ext cx="5486400" cy="3086100"/>
-          </a:xfrm>
-          <a:prstGeom prst="rect">
-            <a:avLst/>
-          </a:prstGeom>
-        </p:spPr>
-      </p:sp>
-      <p:sp>
-        <p:nvSpPr>
-          <p:cNvPr id="149" name="PlaceHolder 2"/>
-          <p:cNvSpPr>
-            <a:spLocks noGrp="1"/>
-          </p:cNvSpPr>
-          <p:nvPr>
-            <p:ph type="body"/>
-          </p:nvPr>
-        </p:nvSpPr>
-        <p:spPr>
-          <a:xfrm>
-            <a:off x="685800" y="4400640"/>
-            <a:ext cx="5486040" cy="3600000"/>
-          </a:xfrm>
-          <a:prstGeom prst="rect">
-            <a:avLst/>
-          </a:prstGeom>
-        </p:spPr>
-        <p:txBody>
-          <a:bodyPr>
-            <a:noAutofit/>
-          </a:bodyPr>
-          <a:lstStyle/>
-          <a:p>
-            <a:endParaRPr lang="en-US" sz="2000" b="0" strike="noStrike" spc="-1">
-              <a:latin typeface="Arial"/>
-            </a:endParaRPr>
-          </a:p>
-        </p:txBody>
-      </p:sp>
-      <p:sp>
-        <p:nvSpPr>
-          <p:cNvPr id="150" name="TextShape 3"/>
-          <p:cNvSpPr txBox="1"/>
-          <p:nvPr/>
-        </p:nvSpPr>
-        <p:spPr>
-          <a:xfrm>
-            <a:off x="3884760" y="8685360"/>
-            <a:ext cx="2971440" cy="458280"/>
-          </a:xfrm>
-          <a:prstGeom prst="rect">
-            <a:avLst/>
-          </a:prstGeom>
-          <a:noFill/>
-          <a:ln>
-            <a:noFill/>
-          </a:ln>
-        </p:spPr>
-        <p:txBody>
-          <a:bodyPr anchor="b">
-            <a:noAutofit/>
-          </a:bodyPr>
-          <a:lstStyle/>
-          <a:p>
-            <a:pPr algn="r">
-              <a:lnSpc>
-                <a:spcPct val="100000"/>
-              </a:lnSpc>
-            </a:pPr>
-            <a:fld id="{677DA20C-D3E3-4F02-A624-D52A93CA4942}" type="slidenum">
-              <a:rPr lang="en-GB" sz="1200" b="0" strike="noStrike" spc="-1">
-                <a:latin typeface="Times New Roman"/>
-              </a:rPr>
+              <a:pPr algn="r">
+                <a:lnSpc>
+                  <a:spcPct val="100000"/>
+                </a:lnSpc>
+              </a:pPr>
               <a:t>11</a:t>
             </a:fld>
             <a:endParaRPr lang="en-US" sz="1200" b="0" strike="noStrike" spc="-1">
@@ -1646,7 +1566,7 @@
     <p:bg>
       <p:bgPr>
         <a:blipFill dpi="0" rotWithShape="1">
-          <a:blip r:embed="rId2">
+          <a:blip r:embed="rId2" cstate="print">
             <a:lum/>
           </a:blip>
           <a:srcRect/>
@@ -1680,7 +1600,7 @@
           <p:nvPr userDrawn="1"/>
         </p:nvPicPr>
         <p:blipFill>
-          <a:blip r:embed="rId3"/>
+          <a:blip r:embed="rId3" cstate="print"/>
           <a:stretch>
             <a:fillRect/>
           </a:stretch>
@@ -1895,6 +1815,7 @@
           <a:p>
             <a:fld id="{E4D355CA-84B7-41B1-B164-8BB439CC7C6B}" type="slidenum">
               <a:rPr lang="en-GB" smtClean="0"/>
+              <a:pPr/>
               <a:t>‹#›</a:t>
             </a:fld>
             <a:endParaRPr lang="en-GB"/>
@@ -2415,6 +2336,7 @@
           <a:p>
             <a:fld id="{E4D355CA-84B7-41B1-B164-8BB439CC7C6B}" type="slidenum">
               <a:rPr lang="en-GB" smtClean="0"/>
+              <a:pPr/>
               <a:t>‹#›</a:t>
             </a:fld>
             <a:endParaRPr lang="en-GB" dirty="0"/>
@@ -2665,6 +2587,7 @@
           <a:p>
             <a:fld id="{E4D355CA-84B7-41B1-B164-8BB439CC7C6B}" type="slidenum">
               <a:rPr lang="en-GB" smtClean="0"/>
+              <a:pPr/>
               <a:t>‹#›</a:t>
             </a:fld>
             <a:endParaRPr lang="en-GB" dirty="0"/>
@@ -2868,6 +2791,7 @@
           <a:p>
             <a:fld id="{E4D355CA-84B7-41B1-B164-8BB439CC7C6B}" type="slidenum">
               <a:rPr lang="en-GB" smtClean="0"/>
+              <a:pPr/>
               <a:t>‹#›</a:t>
             </a:fld>
             <a:endParaRPr lang="en-GB" dirty="0"/>
@@ -2974,7 +2898,7 @@
           <p:nvPr userDrawn="1"/>
         </p:nvPicPr>
         <p:blipFill>
-          <a:blip r:embed="rId2"/>
+          <a:blip r:embed="rId2" cstate="print"/>
           <a:stretch>
             <a:fillRect/>
           </a:stretch>
@@ -3221,6 +3145,7 @@
           <a:p>
             <a:fld id="{E4D355CA-84B7-41B1-B164-8BB439CC7C6B}" type="slidenum">
               <a:rPr lang="en-GB" smtClean="0"/>
+              <a:pPr/>
               <a:t>‹#›</a:t>
             </a:fld>
             <a:endParaRPr lang="en-GB"/>
@@ -3423,6 +3348,7 @@
           <a:p>
             <a:fld id="{E4D355CA-84B7-41B1-B164-8BB439CC7C6B}" type="slidenum">
               <a:rPr lang="en-GB" smtClean="0"/>
+              <a:pPr/>
               <a:t>‹#›</a:t>
             </a:fld>
             <a:endParaRPr lang="en-GB"/>
@@ -3604,6 +3530,7 @@
           <a:p>
             <a:fld id="{E4D355CA-84B7-41B1-B164-8BB439CC7C6B}" type="slidenum">
               <a:rPr lang="en-GB" smtClean="0"/>
+              <a:pPr/>
               <a:t>‹#›</a:t>
             </a:fld>
             <a:endParaRPr lang="en-GB"/>
@@ -3714,6 +3641,7 @@
           <a:p>
             <a:fld id="{E4D355CA-84B7-41B1-B164-8BB439CC7C6B}" type="slidenum">
               <a:rPr lang="en-GB" smtClean="0"/>
+              <a:pPr/>
               <a:t>‹#›</a:t>
             </a:fld>
             <a:endParaRPr lang="en-GB" dirty="0"/>
@@ -3973,6 +3901,7 @@
           <a:p>
             <a:fld id="{E4D355CA-84B7-41B1-B164-8BB439CC7C6B}" type="slidenum">
               <a:rPr lang="en-GB" smtClean="0"/>
+              <a:pPr/>
               <a:t>‹#›</a:t>
             </a:fld>
             <a:endParaRPr lang="en-GB"/>
@@ -4144,6 +4073,7 @@
           <a:p>
             <a:fld id="{E4D355CA-84B7-41B1-B164-8BB439CC7C6B}" type="slidenum">
               <a:rPr lang="en-GB" smtClean="0"/>
+              <a:pPr/>
               <a:t>‹#›</a:t>
             </a:fld>
             <a:endParaRPr lang="en-GB"/>
@@ -4565,6 +4495,7 @@
           <a:p>
             <a:fld id="{E4D355CA-84B7-41B1-B164-8BB439CC7C6B}" type="slidenum">
               <a:rPr lang="en-GB" smtClean="0"/>
+              <a:pPr/>
               <a:t>‹#›</a:t>
             </a:fld>
             <a:endParaRPr lang="en-GB" dirty="0"/>
@@ -4889,7 +4820,7 @@
     <p:bg>
       <p:bgPr>
         <a:blipFill dpi="0" rotWithShape="1">
-          <a:blip r:embed="rId2">
+          <a:blip r:embed="rId2" cstate="print">
             <a:lum/>
           </a:blip>
           <a:srcRect/>
@@ -4949,6 +4880,10 @@
               <a:rPr lang="en-US" sz="2200" dirty="0"/>
               <a:t>Date: </a:t>
             </a:r>
+            <a:r>
+              <a:rPr lang="en-US" sz="8000" dirty="0"/>
+              <a:t/>
+            </a:r>
             <a:br>
               <a:rPr lang="en-US" sz="8000" dirty="0"/>
             </a:br>
@@ -5042,6 +4977,7 @@
           <a:p>
             <a:fld id="{E4D355CA-84B7-41B1-B164-8BB439CC7C6B}" type="slidenum">
               <a:rPr lang="en-GB" smtClean="0"/>
+              <a:pPr/>
               <a:t>1</a:t>
             </a:fld>
             <a:endParaRPr lang="en-GB" dirty="0"/>
@@ -5155,6 +5091,11 @@
                 </a:solidFill>
                 <a:latin typeface="Arial"/>
               </a:rPr>
+              <a:pPr algn="r">
+                <a:lnSpc>
+                  <a:spcPct val="100000"/>
+                </a:lnSpc>
+              </a:pPr>
               <a:t>10</a:t>
             </a:fld>
             <a:endParaRPr lang="en-US" sz="1500" b="0" strike="noStrike" spc="-1">
@@ -5534,6 +5475,11 @@
                 </a:solidFill>
                 <a:latin typeface="Arial"/>
               </a:rPr>
+              <a:pPr algn="r">
+                <a:lnSpc>
+                  <a:spcPct val="100000"/>
+                </a:lnSpc>
+              </a:pPr>
               <a:t>11</a:t>
             </a:fld>
             <a:endParaRPr lang="en-US" sz="1500" b="0" strike="noStrike" spc="-1">
@@ -5711,345 +5657,7 @@
           <a:chExt cx="0" cy="0"/>
         </a:xfrm>
       </p:grpSpPr>
-      <p:sp>
-        <p:nvSpPr>
-          <p:cNvPr id="2" name="Subtitle 1"/>
-          <p:cNvSpPr>
-            <a:spLocks noGrp="1"/>
-          </p:cNvSpPr>
-          <p:nvPr>
-            <p:ph type="subTitle" idx="1"/>
-          </p:nvPr>
-        </p:nvSpPr>
-        <p:spPr>
-          <a:xfrm>
-            <a:off x="965288" y="1080637"/>
-            <a:ext cx="10110240" cy="588024"/>
-          </a:xfrm>
-        </p:spPr>
-        <p:txBody>
-          <a:bodyPr/>
-          <a:lstStyle/>
-          <a:p>
-            <a:r>
-              <a:rPr lang="en-US" sz="2400" b="0" dirty="0">
-                <a:latin typeface="Calibri" panose="020F0502020204030204" pitchFamily="34" charset="0"/>
-                <a:cs typeface="Calibri" panose="020F0502020204030204" pitchFamily="34" charset="0"/>
-              </a:rPr>
-              <a:t>We are using the dataset</a:t>
-            </a:r>
-            <a:r>
-              <a:rPr lang="en-US" sz="2400" b="0" dirty="0">
-                <a:solidFill>
-                  <a:srgbClr val="FF0000"/>
-                </a:solidFill>
-                <a:latin typeface="Calibri" panose="020F0502020204030204" pitchFamily="34" charset="0"/>
-                <a:cs typeface="Calibri" panose="020F0502020204030204" pitchFamily="34" charset="0"/>
-              </a:rPr>
-              <a:t> </a:t>
-            </a:r>
-            <a:r>
-              <a:rPr lang="en-US" altLang="en-US" sz="2400" b="0" dirty="0">
-                <a:solidFill>
-                  <a:srgbClr val="FF0000"/>
-                </a:solidFill>
-                <a:latin typeface="Calibri" panose="020F0502020204030204" pitchFamily="34" charset="0"/>
-                <a:cs typeface="Calibri" panose="020F0502020204030204" pitchFamily="34" charset="0"/>
-              </a:rPr>
-              <a:t>DS080,Postpartum_Women_Participating.csv</a:t>
-            </a:r>
-            <a:r>
-              <a:rPr lang="en-US" sz="2400" b="0" dirty="0">
-                <a:solidFill>
-                  <a:srgbClr val="FF0000"/>
-                </a:solidFill>
-                <a:latin typeface="Calibri" panose="020F0502020204030204" pitchFamily="34" charset="0"/>
-                <a:cs typeface="Calibri" panose="020F0502020204030204" pitchFamily="34" charset="0"/>
-              </a:rPr>
-              <a:t> </a:t>
-            </a:r>
-            <a:r>
-              <a:rPr lang="en-US" sz="2400" b="0" dirty="0">
-                <a:solidFill>
-                  <a:schemeClr val="tx1"/>
-                </a:solidFill>
-                <a:latin typeface="Calibri" panose="020F0502020204030204" pitchFamily="34" charset="0"/>
-                <a:cs typeface="Calibri" panose="020F0502020204030204" pitchFamily="34" charset="0"/>
-              </a:rPr>
-              <a:t> to answer our Research Question</a:t>
-            </a:r>
-            <a:endParaRPr lang="en-US" sz="2400" baseline="30000" dirty="0">
-              <a:solidFill>
-                <a:schemeClr val="tx1"/>
-              </a:solidFill>
-              <a:latin typeface="Calibri" panose="020F0502020204030204" pitchFamily="34" charset="0"/>
-              <a:cs typeface="Calibri" panose="020F0502020204030204" pitchFamily="34" charset="0"/>
-            </a:endParaRPr>
-          </a:p>
-          <a:p>
-            <a:br>
-              <a:rPr lang="en-US" sz="2400" b="0" dirty="0">
-                <a:solidFill>
-                  <a:srgbClr val="FF0000"/>
-                </a:solidFill>
-                <a:latin typeface="Calibri" panose="020F0502020204030204" pitchFamily="34" charset="0"/>
-                <a:cs typeface="Calibri" panose="020F0502020204030204" pitchFamily="34" charset="0"/>
-              </a:rPr>
-            </a:br>
-            <a:endParaRPr lang="en-US" sz="2400" dirty="0">
-              <a:solidFill>
-                <a:schemeClr val="tx1"/>
-              </a:solidFill>
-              <a:latin typeface="Calibri" panose="020F0502020204030204" pitchFamily="34" charset="0"/>
-              <a:cs typeface="Calibri" panose="020F0502020204030204" pitchFamily="34" charset="0"/>
-            </a:endParaRPr>
-          </a:p>
-        </p:txBody>
-      </p:sp>
-      <p:sp>
-        <p:nvSpPr>
-          <p:cNvPr id="3" name="Footer Placeholder 2"/>
-          <p:cNvSpPr>
-            <a:spLocks noGrp="1"/>
-          </p:cNvSpPr>
-          <p:nvPr>
-            <p:ph type="ftr" sz="quarter" idx="11"/>
-          </p:nvPr>
-        </p:nvSpPr>
-        <p:spPr>
-          <a:xfrm>
-            <a:off x="965288" y="791022"/>
-            <a:ext cx="9129687" cy="230832"/>
-          </a:xfrm>
-        </p:spPr>
-        <p:txBody>
-          <a:bodyPr/>
-          <a:lstStyle/>
-          <a:p>
-            <a:r>
-              <a:rPr lang="en-GB" dirty="0"/>
-              <a:t>7COM1079-2024  Student Group No:       </a:t>
-            </a:r>
-            <a:r>
-              <a:rPr lang="en-US" altLang="en-GB" dirty="0"/>
-              <a:t>A113</a:t>
-            </a:r>
-            <a:r>
-              <a:rPr lang="en-GB" dirty="0"/>
-              <a:t>             Names of Student Group Attendees: </a:t>
-            </a:r>
-          </a:p>
-        </p:txBody>
-      </p:sp>
-      <p:sp>
-        <p:nvSpPr>
-          <p:cNvPr id="4" name="Slide Number Placeholder 3"/>
-          <p:cNvSpPr>
-            <a:spLocks noGrp="1"/>
-          </p:cNvSpPr>
-          <p:nvPr>
-            <p:ph type="sldNum" sz="quarter" idx="12"/>
-          </p:nvPr>
-        </p:nvSpPr>
-        <p:spPr/>
-        <p:txBody>
-          <a:bodyPr/>
-          <a:lstStyle/>
-          <a:p>
-            <a:fld id="{E4D355CA-84B7-41B1-B164-8BB439CC7C6B}" type="slidenum">
-              <a:rPr lang="en-GB" smtClean="0"/>
-              <a:t>2</a:t>
-            </a:fld>
-            <a:endParaRPr lang="en-GB" dirty="0"/>
-          </a:p>
-        </p:txBody>
-      </p:sp>
-      <p:sp>
-        <p:nvSpPr>
-          <p:cNvPr id="14" name="TextBox 13"/>
-          <p:cNvSpPr txBox="1"/>
-          <p:nvPr/>
-        </p:nvSpPr>
-        <p:spPr>
-          <a:xfrm>
-            <a:off x="846455" y="4698365"/>
-            <a:ext cx="4353560" cy="737235"/>
-          </a:xfrm>
-          <a:prstGeom prst="rect">
-            <a:avLst/>
-          </a:prstGeom>
-          <a:solidFill>
-            <a:srgbClr val="FFFF00"/>
-          </a:solidFill>
-        </p:spPr>
-        <p:txBody>
-          <a:bodyPr wrap="square">
-            <a:spAutoFit/>
-          </a:bodyPr>
-          <a:lstStyle/>
-          <a:p>
-            <a:r>
-              <a:rPr lang="en-US" altLang="en-GB" sz="1400" dirty="0"/>
-              <a:t>DataSet have 92 Rows.</a:t>
-            </a:r>
-          </a:p>
-          <a:p>
-            <a:r>
-              <a:rPr lang="en-US" altLang="en-GB" sz="1400" dirty="0"/>
-              <a:t>Dependent variable: Average fund Allocation</a:t>
-            </a:r>
-          </a:p>
-          <a:p>
-            <a:r>
-              <a:rPr lang="en-US" altLang="en-GB" sz="1400" dirty="0"/>
-              <a:t>Independent Variable: States name</a:t>
-            </a:r>
-          </a:p>
-        </p:txBody>
-      </p:sp>
-      <p:sp>
-        <p:nvSpPr>
-          <p:cNvPr id="17" name="TextBox 16"/>
-          <p:cNvSpPr txBox="1"/>
-          <p:nvPr/>
-        </p:nvSpPr>
-        <p:spPr>
-          <a:xfrm>
-            <a:off x="846339" y="2136646"/>
-            <a:ext cx="4860975" cy="1938020"/>
-          </a:xfrm>
-          <a:prstGeom prst="rect">
-            <a:avLst/>
-          </a:prstGeom>
-          <a:noFill/>
-        </p:spPr>
-        <p:txBody>
-          <a:bodyPr wrap="square" rtlCol="0">
-            <a:spAutoFit/>
-          </a:bodyPr>
-          <a:lstStyle/>
-          <a:p>
-            <a:pPr>
-              <a:spcAft>
-                <a:spcPts val="0"/>
-              </a:spcAft>
-            </a:pPr>
-            <a:r>
-              <a:rPr lang="en-GB" sz="2400" dirty="0">
-                <a:sym typeface="+mn-ea"/>
-              </a:rPr>
-              <a:t>"Is there a correlation between time (from October 2012 to September 2013) and the average fund allocation across states?"</a:t>
-            </a:r>
-            <a:endParaRPr lang="en-GB" sz="2400" dirty="0">
-              <a:solidFill>
-                <a:srgbClr val="FF0000"/>
-              </a:solidFill>
-            </a:endParaRPr>
-          </a:p>
-        </p:txBody>
-      </p:sp>
-      <mc:AlternateContent xmlns:mc="http://schemas.openxmlformats.org/markup-compatibility/2006" xmlns:p14="http://schemas.microsoft.com/office/powerpoint/2010/main">
-        <mc:Choice Requires="p14">
-          <p:contentPart p14:bwMode="auto" r:id="rId3">
-            <p14:nvContentPartPr>
-              <p14:cNvPr id="26" name="Ink 25"/>
-              <p14:cNvContentPartPr/>
-              <p14:nvPr/>
-            </p14:nvContentPartPr>
-            <p14:xfrm>
-              <a:off x="11548041" y="2705494"/>
-              <a:ext cx="360" cy="360"/>
-            </p14:xfrm>
-          </p:contentPart>
-        </mc:Choice>
-        <mc:Fallback xmlns="">
-          <p:pic>
-            <p:nvPicPr>
-              <p:cNvPr id="26" name="Ink 25"/>
-            </p:nvPicPr>
-            <p:blipFill>
-              <a:blip r:embed="rId4"/>
-            </p:blipFill>
-            <p:spPr>
-              <a:xfrm>
-                <a:off x="11548041" y="2705494"/>
-                <a:ext cx="360" cy="360"/>
-              </a:xfrm>
-              <a:prstGeom prst="rect"/>
-            </p:spPr>
-          </p:pic>
-        </mc:Fallback>
-      </mc:AlternateContent>
-      <p:cxnSp>
-        <p:nvCxnSpPr>
-          <p:cNvPr id="30" name="Straight Arrow Connector 29"/>
-          <p:cNvCxnSpPr/>
-          <p:nvPr/>
-        </p:nvCxnSpPr>
-        <p:spPr>
-          <a:xfrm flipV="1">
-            <a:off x="5200015" y="4074795"/>
-            <a:ext cx="376555" cy="1905"/>
-          </a:xfrm>
-          <a:prstGeom prst="straightConnector1">
-            <a:avLst/>
-          </a:prstGeom>
-          <a:ln w="38100" cap="flat" cmpd="sng" algn="ctr">
-            <a:solidFill>
-              <a:schemeClr val="dk1"/>
-            </a:solidFill>
-            <a:prstDash val="solid"/>
-            <a:round/>
-            <a:headEnd type="none" w="med" len="med"/>
-            <a:tailEnd type="arrow" w="med" len="med"/>
-          </a:ln>
-        </p:spPr>
-        <p:style>
-          <a:lnRef idx="0">
-            <a:scrgbClr r="0" g="0" b="0"/>
-          </a:lnRef>
-          <a:fillRef idx="0">
-            <a:scrgbClr r="0" g="0" b="0"/>
-          </a:fillRef>
-          <a:effectRef idx="0">
-            <a:scrgbClr r="0" g="0" b="0"/>
-          </a:effectRef>
-          <a:fontRef idx="minor">
-            <a:schemeClr val="tx1"/>
-          </a:fontRef>
-        </p:style>
-      </p:cxnSp>
-      <p:pic>
-        <p:nvPicPr>
-          <p:cNvPr id="5" name="Picture 4" descr="Screenshot from 2024-11-14 20-46-14"/>
-          <p:cNvPicPr>
-            <a:picLocks noChangeAspect="1"/>
-          </p:cNvPicPr>
-          <p:nvPr/>
-        </p:nvPicPr>
-        <p:blipFill>
-          <a:blip r:embed="rId5"/>
-          <a:srcRect l="21510" t="40579" r="2835" b="17838"/>
-          <a:stretch>
-            <a:fillRect/>
-          </a:stretch>
-        </p:blipFill>
-        <p:spPr>
-          <a:xfrm>
-            <a:off x="5707380" y="1511300"/>
-            <a:ext cx="6321425" cy="2898140"/>
-          </a:xfrm>
-          <a:prstGeom prst="rect">
-            <a:avLst/>
-          </a:prstGeom>
-        </p:spPr>
-      </p:pic>
     </p:spTree>
-    <p:extLst>
-      <p:ext uri="{BB962C8B-B14F-4D97-AF65-F5344CB8AC3E}">
-        <p14:creationId xmlns:p14="http://schemas.microsoft.com/office/powerpoint/2010/main" val="2582155256"/>
-      </p:ext>
-    </p:extLst>
   </p:cSld>
   <p:clrMapOvr>
     <a:masterClrMapping/>
@@ -6117,6 +5725,7 @@
           <a:p>
             <a:fld id="{E4D355CA-84B7-41B1-B164-8BB439CC7C6B}" type="slidenum">
               <a:rPr lang="en-GB" smtClean="0"/>
+              <a:pPr/>
               <a:t>3</a:t>
             </a:fld>
             <a:endParaRPr lang="en-GB" dirty="0"/>
@@ -6132,7 +5741,7 @@
           <p:nvPr/>
         </p:nvPicPr>
         <p:blipFill>
-          <a:blip r:embed="rId3"/>
+          <a:blip r:embed="rId3" cstate="print"/>
           <a:srcRect l="39851" t="45136" r="297"/>
           <a:stretch>
             <a:fillRect/>
@@ -6157,7 +5766,7 @@
           <p:nvPr/>
         </p:nvPicPr>
         <p:blipFill>
-          <a:blip r:embed="rId4"/>
+          <a:blip r:embed="rId4" cstate="print"/>
           <a:srcRect l="40274" t="43036" r="556" b="882"/>
           <a:stretch>
             <a:fillRect/>
@@ -6176,7 +5785,7 @@
     </p:spTree>
     <p:extLst>
       <p:ext uri="{BB962C8B-B14F-4D97-AF65-F5344CB8AC3E}">
-        <p14:creationId xmlns:p14="http://schemas.microsoft.com/office/powerpoint/2010/main" val="1263902789"/>
+        <p14:creationId xmlns="" xmlns:p14="http://schemas.microsoft.com/office/powerpoint/2010/main" val="1263902789"/>
       </p:ext>
     </p:extLst>
   </p:cSld>
@@ -6194,7 +5803,7 @@
         <p:cNvPr id="1" name="">
           <a:extLst>
             <a:ext uri="{FF2B5EF4-FFF2-40B4-BE49-F238E27FC236}">
-              <a16:creationId xmlns:a16="http://schemas.microsoft.com/office/drawing/2014/main" id="{41A7862A-A984-D8A5-1BBC-F0B3E475B17D}"/>
+              <a16:creationId xmlns="" xmlns:a16="http://schemas.microsoft.com/office/drawing/2014/main" id="{41A7862A-A984-D8A5-1BBC-F0B3E475B17D}"/>
             </a:ext>
           </a:extLst>
         </p:cNvPr>
@@ -6214,7 +5823,7 @@
           <p:cNvPr id="3" name="Footer Placeholder 2">
             <a:extLst>
               <a:ext uri="{FF2B5EF4-FFF2-40B4-BE49-F238E27FC236}">
-                <a16:creationId xmlns:a16="http://schemas.microsoft.com/office/drawing/2014/main" id="{18997380-5D24-BDF7-A346-0D7A7C66F023}"/>
+                <a16:creationId xmlns="" xmlns:a16="http://schemas.microsoft.com/office/drawing/2014/main" id="{18997380-5D24-BDF7-A346-0D7A7C66F023}"/>
               </a:ext>
             </a:extLst>
           </p:cNvPr>
@@ -6251,7 +5860,7 @@
           <p:cNvPr id="4" name="Slide Number Placeholder 3">
             <a:extLst>
               <a:ext uri="{FF2B5EF4-FFF2-40B4-BE49-F238E27FC236}">
-                <a16:creationId xmlns:a16="http://schemas.microsoft.com/office/drawing/2014/main" id="{DB493747-75AF-C0EA-3068-FC324ADB5938}"/>
+                <a16:creationId xmlns="" xmlns:a16="http://schemas.microsoft.com/office/drawing/2014/main" id="{DB493747-75AF-C0EA-3068-FC324ADB5938}"/>
               </a:ext>
             </a:extLst>
           </p:cNvPr>
@@ -6269,6 +5878,7 @@
           <a:p>
             <a:fld id="{E4D355CA-84B7-41B1-B164-8BB439CC7C6B}" type="slidenum">
               <a:rPr lang="en-GB" smtClean="0"/>
+              <a:pPr/>
               <a:t>4</a:t>
             </a:fld>
             <a:endParaRPr lang="en-GB" dirty="0"/>
@@ -6280,7 +5890,7 @@
           <p:cNvPr id="2" name="Picture 1" descr="Screenshot from 2024-11-14 23-06-54">
             <a:extLst>
               <a:ext uri="{FF2B5EF4-FFF2-40B4-BE49-F238E27FC236}">
-                <a16:creationId xmlns:a16="http://schemas.microsoft.com/office/drawing/2014/main" id="{CFE4F31A-C237-45DB-8F4A-B392269D27CC}"/>
+                <a16:creationId xmlns="" xmlns:a16="http://schemas.microsoft.com/office/drawing/2014/main" id="{CFE4F31A-C237-45DB-8F4A-B392269D27CC}"/>
               </a:ext>
             </a:extLst>
           </p:cNvPr>
@@ -6290,7 +5900,7 @@
           <p:nvPr/>
         </p:nvPicPr>
         <p:blipFill>
-          <a:blip r:embed="rId3"/>
+          <a:blip r:embed="rId3" cstate="print"/>
           <a:srcRect l="24465" t="42678"/>
           <a:stretch>
             <a:fillRect/>
@@ -6311,7 +5921,7 @@
           <p:cNvPr id="5" name="Picture 4" descr="Screenshot from 2024-11-14 23-25-00">
             <a:extLst>
               <a:ext uri="{FF2B5EF4-FFF2-40B4-BE49-F238E27FC236}">
-                <a16:creationId xmlns:a16="http://schemas.microsoft.com/office/drawing/2014/main" id="{D901F399-9D4C-CC65-E91C-C262416627A1}"/>
+                <a16:creationId xmlns="" xmlns:a16="http://schemas.microsoft.com/office/drawing/2014/main" id="{D901F399-9D4C-CC65-E91C-C262416627A1}"/>
               </a:ext>
             </a:extLst>
           </p:cNvPr>
@@ -6321,7 +5931,7 @@
           <p:nvPr/>
         </p:nvPicPr>
         <p:blipFill>
-          <a:blip r:embed="rId4"/>
+          <a:blip r:embed="rId4" cstate="print"/>
           <a:srcRect l="32161" t="42075"/>
           <a:stretch>
             <a:fillRect/>
@@ -6340,7 +5950,7 @@
     </p:spTree>
     <p:extLst>
       <p:ext uri="{BB962C8B-B14F-4D97-AF65-F5344CB8AC3E}">
-        <p14:creationId xmlns:p14="http://schemas.microsoft.com/office/powerpoint/2010/main" val="3796487209"/>
+        <p14:creationId xmlns="" xmlns:p14="http://schemas.microsoft.com/office/powerpoint/2010/main" val="3796487209"/>
       </p:ext>
     </p:extLst>
   </p:cSld>
@@ -6415,6 +6025,7 @@
           <a:p>
             <a:fld id="{E4D355CA-84B7-41B1-B164-8BB439CC7C6B}" type="slidenum">
               <a:rPr lang="en-GB" smtClean="0"/>
+              <a:pPr/>
               <a:t>5</a:t>
             </a:fld>
             <a:endParaRPr lang="en-GB" dirty="0"/>
@@ -6430,7 +6041,7 @@
           <p:nvPr/>
         </p:nvPicPr>
         <p:blipFill>
-          <a:blip r:embed="rId3"/>
+          <a:blip r:embed="rId3" cstate="print"/>
           <a:srcRect l="24130" t="42678"/>
           <a:stretch>
             <a:fillRect/>
@@ -6724,6 +6335,15 @@
                 <a:latin typeface="Arial"/>
               </a:rPr>
             </a:br>
+            <a:r>
+              <a:rPr lang="en-US" sz="2400" b="0" strike="noStrike" spc="-202">
+                <a:solidFill>
+                  <a:srgbClr val="FFFFFF"/>
+                </a:solidFill>
+                <a:latin typeface="Arial"/>
+              </a:rPr>
+              <a:t/>
+            </a:r>
             <a:br>
               <a:rPr lang="en-US" sz="2400" b="0" strike="noStrike" spc="-202">
                 <a:solidFill>
@@ -6832,6 +6452,14 @@
                 </a:solidFill>
                 <a:latin typeface="Arial"/>
               </a:rPr>
+              <a:pPr algn="r">
+                <a:lnSpc>
+                  <a:spcPct val="100000"/>
+                </a:lnSpc>
+                <a:spcAft>
+                  <a:spcPts val="600"/>
+                </a:spcAft>
+              </a:pPr>
               <a:t>6</a:t>
             </a:fld>
             <a:endParaRPr lang="en-US" sz="1100" b="0" strike="noStrike" spc="-1">
@@ -7258,7 +6886,7 @@
           <p:nvPr/>
         </p:nvPicPr>
         <p:blipFill>
-          <a:blip r:embed="rId3"/>
+          <a:blip r:embed="rId3" cstate="print"/>
           <a:srcRect l="40192" t="42969" r="3258" b="3038"/>
           <a:stretch>
             <a:fillRect/>
@@ -7552,6 +7180,15 @@
                 <a:latin typeface="Arial"/>
               </a:rPr>
             </a:br>
+            <a:r>
+              <a:rPr lang="en-US" sz="2400" b="0" strike="noStrike" spc="-202">
+                <a:solidFill>
+                  <a:srgbClr val="FFFFFF"/>
+                </a:solidFill>
+                <a:latin typeface="Arial"/>
+              </a:rPr>
+              <a:t/>
+            </a:r>
             <a:br>
               <a:rPr lang="en-US" sz="2400" b="0" strike="noStrike" spc="-202">
                 <a:solidFill>
@@ -7660,6 +7297,14 @@
                 </a:solidFill>
                 <a:latin typeface="Arial"/>
               </a:rPr>
+              <a:pPr algn="r">
+                <a:lnSpc>
+                  <a:spcPct val="100000"/>
+                </a:lnSpc>
+                <a:spcAft>
+                  <a:spcPts val="600"/>
+                </a:spcAft>
+              </a:pPr>
               <a:t>7</a:t>
             </a:fld>
             <a:endParaRPr lang="en-US" sz="1100" b="0" strike="noStrike" spc="-1">
@@ -8096,7 +7741,7 @@
           <p:nvPr/>
         </p:nvPicPr>
         <p:blipFill>
-          <a:blip r:embed="rId2"/>
+          <a:blip r:embed="rId2" cstate="print"/>
           <a:srcRect l="32414" t="43025" r="3340" b="4334"/>
           <a:stretch>
             <a:fillRect/>
@@ -8219,6 +7864,11 @@
                 </a:solidFill>
                 <a:latin typeface="Arial"/>
               </a:rPr>
+              <a:pPr algn="r">
+                <a:lnSpc>
+                  <a:spcPct val="100000"/>
+                </a:lnSpc>
+              </a:pPr>
               <a:t>8</a:t>
             </a:fld>
             <a:endParaRPr lang="en-US" sz="1500" b="0" strike="noStrike" spc="-1">
@@ -8448,6 +8098,11 @@
                 </a:solidFill>
                 <a:latin typeface="Arial"/>
               </a:rPr>
+              <a:pPr algn="r">
+                <a:lnSpc>
+                  <a:spcPct val="100000"/>
+                </a:lnSpc>
+              </a:pPr>
               <a:t>9</a:t>
             </a:fld>
             <a:endParaRPr lang="en-US" sz="1500" b="0" strike="noStrike" spc="-1">
@@ -8871,7 +8526,7 @@
   <a:extraClrSchemeLst/>
   <a:extLst>
     <a:ext uri="{05A4C25C-085E-4340-85A3-A5531E510DB2}">
-      <thm15:themeFamily xmlns:thm15="http://schemas.microsoft.com/office/thememl/2012/main" name="Office Theme" id="{62F939B6-93AF-4DB8-9C6B-D6C7DFDC589F}" vid="{4A3C46E8-61CC-4603-A589-7422A47A8E4A}"/>
+      <thm15:themeFamily xmlns="" xmlns:thm15="http://schemas.microsoft.com/office/thememl/2012/main" name="Office Theme" id="{62F939B6-93AF-4DB8-9C6B-D6C7DFDC589F}" vid="{4A3C46E8-61CC-4603-A589-7422A47A8E4A}"/>
     </a:ext>
   </a:extLst>
 </a:theme>
@@ -9132,7 +8787,7 @@
   <a:extraClrSchemeLst/>
   <a:extLst>
     <a:ext uri="{05A4C25C-085E-4340-85A3-A5531E510DB2}">
-      <thm15:themeFamily xmlns:thm15="http://schemas.microsoft.com/office/thememl/2012/main" name="Office Theme" id="{62F939B6-93AF-4DB8-9C6B-D6C7DFDC589F}" vid="{4A3C46E8-61CC-4603-A589-7422A47A8E4A}"/>
+      <thm15:themeFamily xmlns="" xmlns:thm15="http://schemas.microsoft.com/office/thememl/2012/main" name="Office Theme" id="{62F939B6-93AF-4DB8-9C6B-D6C7DFDC589F}" vid="{4A3C46E8-61CC-4603-A589-7422A47A8E4A}"/>
     </a:ext>
   </a:extLst>
 </a:theme>
@@ -9393,7 +9048,7 @@
   <a:extraClrSchemeLst/>
   <a:extLst>
     <a:ext uri="{05A4C25C-085E-4340-85A3-A5531E510DB2}">
-      <thm15:themeFamily xmlns:thm15="http://schemas.microsoft.com/office/thememl/2012/main" name="Office Theme" id="{62F939B6-93AF-4DB8-9C6B-D6C7DFDC589F}" vid="{4A3C46E8-61CC-4603-A589-7422A47A8E4A}"/>
+      <thm15:themeFamily xmlns="" xmlns:thm15="http://schemas.microsoft.com/office/thememl/2012/main" name="Office Theme" id="{62F939B6-93AF-4DB8-9C6B-D6C7DFDC589F}" vid="{4A3C46E8-61CC-4603-A589-7422A47A8E4A}"/>
     </a:ext>
   </a:extLst>
 </a:theme>

</xml_diff>

<commit_message>
update in reseach question and visualization
</commit_message>
<xml_diff>
--- a/Vis_and_analysis_assignment.pptx
+++ b/Vis_and_analysis_assignment.pptx
@@ -4787,7 +4787,7 @@
               <a:t>Dependent variable: </a:t>
             </a:r>
             <a:r>
-              <a:rPr lang="" altLang="en-US" sz="1400" dirty="0"/>
+              <a:rPr lang="en-US" altLang="en-US" sz="1400" dirty="0"/>
               <a:t>Monthly </a:t>
             </a:r>
             <a:r>
@@ -4807,15 +4807,7 @@
             </a:r>
             <a:r>
               <a:rPr lang="en-US" altLang="en-US" sz="1400" dirty="0"/>
-              <a:t>Time(</a:t>
-            </a:r>
-            <a:r>
-              <a:rPr lang="" altLang="en-US" sz="1400" dirty="0"/>
-              <a:t>Interval</a:t>
-            </a:r>
-            <a:r>
-              <a:rPr lang="en-US" altLang="en-US" sz="1400" dirty="0"/>
-              <a:t>)</a:t>
+              <a:t>Time(Interval)</a:t>
             </a:r>
             <a:endParaRPr lang="en-US" altLang="en-US" sz="1400" dirty="0"/>
           </a:p>
@@ -5799,7 +5791,7 @@
         <p:spPr>
           <a:xfrm>
             <a:off x="6546030" y="2922715"/>
-            <a:ext cx="5057640" cy="2027555"/>
+            <a:ext cx="5057640" cy="1750695"/>
           </a:xfrm>
           <a:prstGeom prst="rect">
             <a:avLst/>
@@ -5866,25 +5858,7 @@
                 </a:solidFill>
                 <a:latin typeface="Arial"/>
               </a:rPr>
-              <a:t>Spearman’s Rho </a:t>
-            </a:r>
-            <a:r>
-              <a:rPr lang="en-GB" sz="1800" b="0" strike="noStrike" spc="-1">
-                <a:solidFill>
-                  <a:srgbClr val="203232"/>
-                </a:solidFill>
-                <a:latin typeface="Arial"/>
-              </a:rPr>
-              <a:t>or </a:t>
-            </a:r>
-            <a:r>
-              <a:rPr lang="en-GB" sz="1800" b="0" strike="noStrike" spc="-1">
-                <a:solidFill>
-                  <a:srgbClr val="0073CF"/>
-                </a:solidFill>
-                <a:latin typeface="Arial"/>
-              </a:rPr>
-              <a:t>Kendal’s Tau</a:t>
+              <a:t>Spearman’s Rho</a:t>
             </a:r>
             <a:endParaRPr lang="en-US" sz="1800" b="0" strike="noStrike" spc="-1">
               <a:latin typeface="Arial"/>

</xml_diff>

<commit_message>
visulization and analysis update FahadNaeem
</commit_message>
<xml_diff>
--- a/Vis_and_analysis_assignment.pptx
+++ b/Vis_and_analysis_assignment.pptx
@@ -13,7 +13,7 @@
   <p:sldIdLst>
     <p:sldId id="289" r:id="rId2"/>
     <p:sldId id="357" r:id="rId3"/>
-    <p:sldId id="358" r:id="rId4"/>
+    <p:sldId id="364" r:id="rId4"/>
     <p:sldId id="359" r:id="rId5"/>
     <p:sldId id="362" r:id="rId6"/>
     <p:sldId id="260" r:id="rId7"/>
@@ -122,7 +122,7 @@
   </p:defaultTextStyle>
   <p:extLst>
     <p:ext uri="{EFAFB233-063F-42B5-8137-9DF3F51BA10A}">
-      <p15:sldGuideLst xmlns="" xmlns:p15="http://schemas.microsoft.com/office/powerpoint/2012/main">
+      <p15:sldGuideLst xmlns:p15="http://schemas.microsoft.com/office/powerpoint/2012/main" xmlns="">
         <p15:guide id="1" orient="horz" pos="2158">
           <p15:clr>
             <a:srgbClr val="A4A3A4"/>
@@ -151,7 +151,7 @@
       </p15:sldGuideLst>
     </p:ext>
     <p:ext uri="{2D200454-40CA-4A62-9FC3-DE9A4176ACB9}">
-      <p15:notesGuideLst xmlns="" xmlns:p15="http://schemas.microsoft.com/office/powerpoint/2012/main"/>
+      <p15:notesGuideLst xmlns:p15="http://schemas.microsoft.com/office/powerpoint/2012/main" xmlns=""/>
     </p:ext>
   </p:extLst>
 </p:presentation>
@@ -316,7 +316,7 @@
     </p:spTree>
     <p:extLst>
       <p:ext uri="{BB962C8B-B14F-4D97-AF65-F5344CB8AC3E}">
-        <p14:creationId xmlns="" xmlns:p14="http://schemas.microsoft.com/office/powerpoint/2010/main" val="1"/>
+        <p14:creationId xmlns:p14="http://schemas.microsoft.com/office/powerpoint/2010/main" xmlns="" val="1"/>
       </p:ext>
     </p:extLst>
   </p:cSld>
@@ -746,7 +746,7 @@
     </p:spTree>
     <p:extLst>
       <p:ext uri="{BB962C8B-B14F-4D97-AF65-F5344CB8AC3E}">
-        <p14:creationId xmlns="" xmlns:p14="http://schemas.microsoft.com/office/powerpoint/2010/main" val="1806677460"/>
+        <p14:creationId xmlns:p14="http://schemas.microsoft.com/office/powerpoint/2010/main" xmlns="" val="1806677460"/>
       </p:ext>
     </p:extLst>
   </p:cSld>
@@ -764,7 +764,7 @@
         <p:cNvPr id="1" name="">
           <a:extLst>
             <a:ext uri="{FF2B5EF4-FFF2-40B4-BE49-F238E27FC236}">
-              <a16:creationId xmlns="" xmlns:a16="http://schemas.microsoft.com/office/drawing/2014/main" id="{FA5405A9-D3C2-B7AD-2BC6-3590BC61E744}"/>
+              <a16:creationId xmlns:a16="http://schemas.microsoft.com/office/drawing/2014/main" xmlns="" id="{FA5405A9-D3C2-B7AD-2BC6-3590BC61E744}"/>
             </a:ext>
           </a:extLst>
         </p:cNvPr>
@@ -784,7 +784,7 @@
           <p:cNvPr id="2" name="Slide Image Placeholder 1">
             <a:extLst>
               <a:ext uri="{FF2B5EF4-FFF2-40B4-BE49-F238E27FC236}">
-                <a16:creationId xmlns="" xmlns:a16="http://schemas.microsoft.com/office/drawing/2014/main" id="{0F8BBEB3-AAED-4334-860F-95F848FBF6A2}"/>
+                <a16:creationId xmlns:a16="http://schemas.microsoft.com/office/drawing/2014/main" xmlns="" id="{0F8BBEB3-AAED-4334-860F-95F848FBF6A2}"/>
               </a:ext>
             </a:extLst>
           </p:cNvPr>
@@ -802,7 +802,7 @@
           <p:cNvPr id="3" name="Notes Placeholder 2">
             <a:extLst>
               <a:ext uri="{FF2B5EF4-FFF2-40B4-BE49-F238E27FC236}">
-                <a16:creationId xmlns="" xmlns:a16="http://schemas.microsoft.com/office/drawing/2014/main" id="{82293F45-3D5B-1C77-209A-A83B9D39580F}"/>
+                <a16:creationId xmlns:a16="http://schemas.microsoft.com/office/drawing/2014/main" xmlns="" id="{82293F45-3D5B-1C77-209A-A83B9D39580F}"/>
               </a:ext>
             </a:extLst>
           </p:cNvPr>
@@ -827,7 +827,7 @@
           <p:cNvPr id="4" name="Slide Number Placeholder 3">
             <a:extLst>
               <a:ext uri="{FF2B5EF4-FFF2-40B4-BE49-F238E27FC236}">
-                <a16:creationId xmlns="" xmlns:a16="http://schemas.microsoft.com/office/drawing/2014/main" id="{6BDF9514-90F9-D472-9AE4-5B6CEB2BC490}"/>
+                <a16:creationId xmlns:a16="http://schemas.microsoft.com/office/drawing/2014/main" xmlns="" id="{6BDF9514-90F9-D472-9AE4-5B6CEB2BC490}"/>
               </a:ext>
             </a:extLst>
           </p:cNvPr>
@@ -855,7 +855,7 @@
     </p:spTree>
     <p:extLst>
       <p:ext uri="{BB962C8B-B14F-4D97-AF65-F5344CB8AC3E}">
-        <p14:creationId xmlns="" xmlns:p14="http://schemas.microsoft.com/office/powerpoint/2010/main" val="935695392"/>
+        <p14:creationId xmlns:p14="http://schemas.microsoft.com/office/powerpoint/2010/main" xmlns="" val="935695392"/>
       </p:ext>
     </p:extLst>
   </p:cSld>
@@ -5785,7 +5785,7 @@
     </p:spTree>
     <p:extLst>
       <p:ext uri="{BB962C8B-B14F-4D97-AF65-F5344CB8AC3E}">
-        <p14:creationId xmlns="" xmlns:p14="http://schemas.microsoft.com/office/powerpoint/2010/main" val="1263902789"/>
+        <p14:creationId xmlns:p14="http://schemas.microsoft.com/office/powerpoint/2010/main" xmlns="" val="1263902789"/>
       </p:ext>
     </p:extLst>
   </p:cSld>
@@ -5803,7 +5803,7 @@
         <p:cNvPr id="1" name="">
           <a:extLst>
             <a:ext uri="{FF2B5EF4-FFF2-40B4-BE49-F238E27FC236}">
-              <a16:creationId xmlns="" xmlns:a16="http://schemas.microsoft.com/office/drawing/2014/main" id="{41A7862A-A984-D8A5-1BBC-F0B3E475B17D}"/>
+              <a16:creationId xmlns:a16="http://schemas.microsoft.com/office/drawing/2014/main" xmlns="" id="{41A7862A-A984-D8A5-1BBC-F0B3E475B17D}"/>
             </a:ext>
           </a:extLst>
         </p:cNvPr>
@@ -5823,7 +5823,7 @@
           <p:cNvPr id="3" name="Footer Placeholder 2">
             <a:extLst>
               <a:ext uri="{FF2B5EF4-FFF2-40B4-BE49-F238E27FC236}">
-                <a16:creationId xmlns="" xmlns:a16="http://schemas.microsoft.com/office/drawing/2014/main" id="{18997380-5D24-BDF7-A346-0D7A7C66F023}"/>
+                <a16:creationId xmlns:a16="http://schemas.microsoft.com/office/drawing/2014/main" xmlns="" id="{18997380-5D24-BDF7-A346-0D7A7C66F023}"/>
               </a:ext>
             </a:extLst>
           </p:cNvPr>
@@ -5860,7 +5860,7 @@
           <p:cNvPr id="4" name="Slide Number Placeholder 3">
             <a:extLst>
               <a:ext uri="{FF2B5EF4-FFF2-40B4-BE49-F238E27FC236}">
-                <a16:creationId xmlns="" xmlns:a16="http://schemas.microsoft.com/office/drawing/2014/main" id="{DB493747-75AF-C0EA-3068-FC324ADB5938}"/>
+                <a16:creationId xmlns:a16="http://schemas.microsoft.com/office/drawing/2014/main" xmlns="" id="{DB493747-75AF-C0EA-3068-FC324ADB5938}"/>
               </a:ext>
             </a:extLst>
           </p:cNvPr>
@@ -5890,7 +5890,7 @@
           <p:cNvPr id="2" name="Picture 1" descr="Screenshot from 2024-11-14 23-06-54">
             <a:extLst>
               <a:ext uri="{FF2B5EF4-FFF2-40B4-BE49-F238E27FC236}">
-                <a16:creationId xmlns="" xmlns:a16="http://schemas.microsoft.com/office/drawing/2014/main" id="{CFE4F31A-C237-45DB-8F4A-B392269D27CC}"/>
+                <a16:creationId xmlns:a16="http://schemas.microsoft.com/office/drawing/2014/main" xmlns="" id="{CFE4F31A-C237-45DB-8F4A-B392269D27CC}"/>
               </a:ext>
             </a:extLst>
           </p:cNvPr>
@@ -5921,7 +5921,7 @@
           <p:cNvPr id="5" name="Picture 4" descr="Screenshot from 2024-11-14 23-25-00">
             <a:extLst>
               <a:ext uri="{FF2B5EF4-FFF2-40B4-BE49-F238E27FC236}">
-                <a16:creationId xmlns="" xmlns:a16="http://schemas.microsoft.com/office/drawing/2014/main" id="{D901F399-9D4C-CC65-E91C-C262416627A1}"/>
+                <a16:creationId xmlns:a16="http://schemas.microsoft.com/office/drawing/2014/main" xmlns="" id="{D901F399-9D4C-CC65-E91C-C262416627A1}"/>
               </a:ext>
             </a:extLst>
           </p:cNvPr>
@@ -5950,7 +5950,7 @@
     </p:spTree>
     <p:extLst>
       <p:ext uri="{BB962C8B-B14F-4D97-AF65-F5344CB8AC3E}">
-        <p14:creationId xmlns="" xmlns:p14="http://schemas.microsoft.com/office/powerpoint/2010/main" val="3796487209"/>
+        <p14:creationId xmlns:p14="http://schemas.microsoft.com/office/powerpoint/2010/main" xmlns="" val="3796487209"/>
       </p:ext>
     </p:extLst>
   </p:cSld>
@@ -8526,7 +8526,7 @@
   <a:extraClrSchemeLst/>
   <a:extLst>
     <a:ext uri="{05A4C25C-085E-4340-85A3-A5531E510DB2}">
-      <thm15:themeFamily xmlns="" xmlns:thm15="http://schemas.microsoft.com/office/thememl/2012/main" name="Office Theme" id="{62F939B6-93AF-4DB8-9C6B-D6C7DFDC589F}" vid="{4A3C46E8-61CC-4603-A589-7422A47A8E4A}"/>
+      <thm15:themeFamily xmlns:thm15="http://schemas.microsoft.com/office/thememl/2012/main" xmlns="" name="Office Theme" id="{62F939B6-93AF-4DB8-9C6B-D6C7DFDC589F}" vid="{4A3C46E8-61CC-4603-A589-7422A47A8E4A}"/>
     </a:ext>
   </a:extLst>
 </a:theme>
@@ -8787,7 +8787,7 @@
   <a:extraClrSchemeLst/>
   <a:extLst>
     <a:ext uri="{05A4C25C-085E-4340-85A3-A5531E510DB2}">
-      <thm15:themeFamily xmlns="" xmlns:thm15="http://schemas.microsoft.com/office/thememl/2012/main" name="Office Theme" id="{62F939B6-93AF-4DB8-9C6B-D6C7DFDC589F}" vid="{4A3C46E8-61CC-4603-A589-7422A47A8E4A}"/>
+      <thm15:themeFamily xmlns:thm15="http://schemas.microsoft.com/office/thememl/2012/main" xmlns="" name="Office Theme" id="{62F939B6-93AF-4DB8-9C6B-D6C7DFDC589F}" vid="{4A3C46E8-61CC-4603-A589-7422A47A8E4A}"/>
     </a:ext>
   </a:extLst>
 </a:theme>
@@ -9048,7 +9048,7 @@
   <a:extraClrSchemeLst/>
   <a:extLst>
     <a:ext uri="{05A4C25C-085E-4340-85A3-A5531E510DB2}">
-      <thm15:themeFamily xmlns="" xmlns:thm15="http://schemas.microsoft.com/office/thememl/2012/main" name="Office Theme" id="{62F939B6-93AF-4DB8-9C6B-D6C7DFDC589F}" vid="{4A3C46E8-61CC-4603-A589-7422A47A8E4A}"/>
+      <thm15:themeFamily xmlns:thm15="http://schemas.microsoft.com/office/thememl/2012/main" xmlns="" name="Office Theme" id="{62F939B6-93AF-4DB8-9C6B-D6C7DFDC589F}" vid="{4A3C46E8-61CC-4603-A589-7422A47A8E4A}"/>
     </a:ext>
   </a:extLst>
 </a:theme>

</xml_diff>